<commit_message>
cleaning up analyses to make coherent with paper
</commit_message>
<xml_diff>
--- a/img/GP-UCB model.pptx
+++ b/img/GP-UCB model.pptx
@@ -5,10 +5,11 @@
     <p:sldMasterId id="2147483804" r:id="rId1"/>
   </p:sldMasterIdLst>
   <p:notesMasterIdLst>
-    <p:notesMasterId r:id="rId3"/>
+    <p:notesMasterId r:id="rId4"/>
   </p:notesMasterIdLst>
   <p:sldIdLst>
     <p:sldId id="256" r:id="rId2"/>
+    <p:sldId id="257" r:id="rId3"/>
   </p:sldIdLst>
   <p:sldSz cx="15479713" cy="3240088"/>
   <p:notesSz cx="6858000" cy="9144000"/>
@@ -118,9 +119,110 @@
 <file path=ppt/revisionInfo.xml><?xml version="1.0" encoding="utf-8"?>
 <p1510:revInfo xmlns:a="http://schemas.openxmlformats.org/drawingml/2006/main" xmlns:r="http://schemas.openxmlformats.org/officeDocument/2006/relationships" xmlns:p1510="http://schemas.microsoft.com/office/powerpoint/2015/10/main">
   <p1510:revLst>
-    <p1510:client id="{5A6DB251-B019-B140-911A-1EC5DBCE2547}" v="27" dt="2025-07-31T17:52:46.457"/>
+    <p1510:client id="{5F05E665-B732-8C49-B033-24C79CD7EFD8}" v="15" dt="2025-08-22T13:33:53.730"/>
   </p1510:revLst>
 </p1510:revInfo>
+</file>
+
+<file path=ppt/changesInfos/changesInfo1.xml><?xml version="1.0" encoding="utf-8"?>
+<pc:chgInfo xmlns:a="http://schemas.openxmlformats.org/drawingml/2006/main" xmlns:r="http://schemas.openxmlformats.org/officeDocument/2006/relationships" xmlns:ac="http://schemas.microsoft.com/office/drawing/2013/main/command" xmlns:pc="http://schemas.microsoft.com/office/powerpoint/2013/main/command">
+  <pc:docChgLst>
+    <pc:chgData name="Björn Meder HMU Potsdam" userId="d258dbf6-ab6a-4282-851d-9abdcd54331d" providerId="ADAL" clId="{4DFD6B1A-A511-587B-86A6-0ACC1CABEBE3}"/>
+    <pc:docChg chg="undo custSel addSld modSld">
+      <pc:chgData name="Björn Meder HMU Potsdam" userId="d258dbf6-ab6a-4282-851d-9abdcd54331d" providerId="ADAL" clId="{4DFD6B1A-A511-587B-86A6-0ACC1CABEBE3}" dt="2025-08-22T16:08:16.288" v="120" actId="1037"/>
+      <pc:docMkLst>
+        <pc:docMk/>
+      </pc:docMkLst>
+      <pc:sldChg chg="addSp delSp modSp add mod">
+        <pc:chgData name="Björn Meder HMU Potsdam" userId="d258dbf6-ab6a-4282-851d-9abdcd54331d" providerId="ADAL" clId="{4DFD6B1A-A511-587B-86A6-0ACC1CABEBE3}" dt="2025-08-22T16:08:16.288" v="120" actId="1037"/>
+        <pc:sldMkLst>
+          <pc:docMk/>
+          <pc:sldMk cId="2162781153" sldId="257"/>
+        </pc:sldMkLst>
+        <pc:spChg chg="add del mod">
+          <ac:chgData name="Björn Meder HMU Potsdam" userId="d258dbf6-ab6a-4282-851d-9abdcd54331d" providerId="ADAL" clId="{4DFD6B1A-A511-587B-86A6-0ACC1CABEBE3}" dt="2025-08-22T13:36:23.430" v="65" actId="478"/>
+          <ac:spMkLst>
+            <pc:docMk/>
+            <pc:sldMk cId="2162781153" sldId="257"/>
+            <ac:spMk id="2" creationId="{15A5FB81-990E-9080-A51C-5302D00A642D}"/>
+          </ac:spMkLst>
+        </pc:spChg>
+        <pc:spChg chg="add mod">
+          <ac:chgData name="Björn Meder HMU Potsdam" userId="d258dbf6-ab6a-4282-851d-9abdcd54331d" providerId="ADAL" clId="{4DFD6B1A-A511-587B-86A6-0ACC1CABEBE3}" dt="2025-08-22T13:36:18.324" v="64" actId="1035"/>
+          <ac:spMkLst>
+            <pc:docMk/>
+            <pc:sldMk cId="2162781153" sldId="257"/>
+            <ac:spMk id="3" creationId="{9DF09782-66BA-6EC5-FD66-8CCC79071751}"/>
+          </ac:spMkLst>
+        </pc:spChg>
+        <pc:spChg chg="add mod">
+          <ac:chgData name="Björn Meder HMU Potsdam" userId="d258dbf6-ab6a-4282-851d-9abdcd54331d" providerId="ADAL" clId="{4DFD6B1A-A511-587B-86A6-0ACC1CABEBE3}" dt="2025-08-22T13:36:18.324" v="64" actId="1035"/>
+          <ac:spMkLst>
+            <pc:docMk/>
+            <pc:sldMk cId="2162781153" sldId="257"/>
+            <ac:spMk id="4" creationId="{430AAB02-2D41-7FEF-3EE1-516B6A2DB5FE}"/>
+          </ac:spMkLst>
+        </pc:spChg>
+        <pc:spChg chg="del">
+          <ac:chgData name="Björn Meder HMU Potsdam" userId="d258dbf6-ab6a-4282-851d-9abdcd54331d" providerId="ADAL" clId="{4DFD6B1A-A511-587B-86A6-0ACC1CABEBE3}" dt="2025-08-22T13:31:12.414" v="1" actId="478"/>
+          <ac:spMkLst>
+            <pc:docMk/>
+            <pc:sldMk cId="2162781153" sldId="257"/>
+            <ac:spMk id="126" creationId="{61A0CABA-6178-F31E-4450-036941C40425}"/>
+          </ac:spMkLst>
+        </pc:spChg>
+        <pc:spChg chg="del">
+          <ac:chgData name="Björn Meder HMU Potsdam" userId="d258dbf6-ab6a-4282-851d-9abdcd54331d" providerId="ADAL" clId="{4DFD6B1A-A511-587B-86A6-0ACC1CABEBE3}" dt="2025-08-22T13:31:16.026" v="2" actId="478"/>
+          <ac:spMkLst>
+            <pc:docMk/>
+            <pc:sldMk cId="2162781153" sldId="257"/>
+            <ac:spMk id="127" creationId="{BAEC18AD-C9D7-D10C-8B42-255A8263CCC2}"/>
+          </ac:spMkLst>
+        </pc:spChg>
+        <pc:spChg chg="mod">
+          <ac:chgData name="Björn Meder HMU Potsdam" userId="d258dbf6-ab6a-4282-851d-9abdcd54331d" providerId="ADAL" clId="{4DFD6B1A-A511-587B-86A6-0ACC1CABEBE3}" dt="2025-08-22T16:08:13.156" v="117" actId="1038"/>
+          <ac:spMkLst>
+            <pc:docMk/>
+            <pc:sldMk cId="2162781153" sldId="257"/>
+            <ac:spMk id="128" creationId="{4BFB5192-6DDE-2644-EB60-3F8655EC779D}"/>
+          </ac:spMkLst>
+        </pc:spChg>
+        <pc:spChg chg="mod">
+          <ac:chgData name="Björn Meder HMU Potsdam" userId="d258dbf6-ab6a-4282-851d-9abdcd54331d" providerId="ADAL" clId="{4DFD6B1A-A511-587B-86A6-0ACC1CABEBE3}" dt="2025-08-22T16:06:06.878" v="101" actId="1038"/>
+          <ac:spMkLst>
+            <pc:docMk/>
+            <pc:sldMk cId="2162781153" sldId="257"/>
+            <ac:spMk id="129" creationId="{47A3F61F-CC7F-4842-5562-D96851CD91A3}"/>
+          </ac:spMkLst>
+        </pc:spChg>
+        <pc:spChg chg="mod">
+          <ac:chgData name="Björn Meder HMU Potsdam" userId="d258dbf6-ab6a-4282-851d-9abdcd54331d" providerId="ADAL" clId="{4DFD6B1A-A511-587B-86A6-0ACC1CABEBE3}" dt="2025-08-22T16:08:16.288" v="120" actId="1037"/>
+          <ac:spMkLst>
+            <pc:docMk/>
+            <pc:sldMk cId="2162781153" sldId="257"/>
+            <ac:spMk id="130" creationId="{30F20D44-CAC9-5025-98A3-1DFC0D55FA7A}"/>
+          </ac:spMkLst>
+        </pc:spChg>
+        <pc:spChg chg="mod">
+          <ac:chgData name="Björn Meder HMU Potsdam" userId="d258dbf6-ab6a-4282-851d-9abdcd54331d" providerId="ADAL" clId="{4DFD6B1A-A511-587B-86A6-0ACC1CABEBE3}" dt="2025-08-22T16:08:01.702" v="109" actId="1037"/>
+          <ac:spMkLst>
+            <pc:docMk/>
+            <pc:sldMk cId="2162781153" sldId="257"/>
+            <ac:spMk id="131" creationId="{8A29EEA5-98EC-C524-B8BB-20B5181B7628}"/>
+          </ac:spMkLst>
+        </pc:spChg>
+        <pc:spChg chg="mod">
+          <ac:chgData name="Björn Meder HMU Potsdam" userId="d258dbf6-ab6a-4282-851d-9abdcd54331d" providerId="ADAL" clId="{4DFD6B1A-A511-587B-86A6-0ACC1CABEBE3}" dt="2025-08-22T16:08:05.129" v="112" actId="1037"/>
+          <ac:spMkLst>
+            <pc:docMk/>
+            <pc:sldMk cId="2162781153" sldId="257"/>
+            <ac:spMk id="132" creationId="{836EC54B-FF28-75A0-A22C-6DC0080B463B}"/>
+          </ac:spMkLst>
+        </pc:spChg>
+      </pc:sldChg>
+    </pc:docChg>
+  </pc:docChgLst>
+</pc:chgInfo>
 </file>
 
 <file path=ppt/notesMasters/notesMaster1.xml><?xml version="1.0" encoding="utf-8"?>
@@ -205,7 +307,7 @@
           <a:p>
             <a:fld id="{A9C99F2B-1E7B-6B45-A3DF-F4C0CAAC18D2}" type="datetimeFigureOut">
               <a:rPr lang="en-US" smtClean="0"/>
-              <a:t>7/31/25</a:t>
+              <a:t>8/22/25</a:t>
             </a:fld>
             <a:endParaRPr lang="en-US"/>
           </a:p>
@@ -562,6 +664,119 @@
 </p:notes>
 </file>
 
+<file path=ppt/notesSlides/notesSlide2.xml><?xml version="1.0" encoding="utf-8"?>
+<p:notes xmlns:a="http://schemas.openxmlformats.org/drawingml/2006/main" xmlns:r="http://schemas.openxmlformats.org/officeDocument/2006/relationships" xmlns:p="http://schemas.openxmlformats.org/presentationml/2006/main">
+  <p:cSld>
+    <p:spTree>
+      <p:nvGrpSpPr>
+        <p:cNvPr id="1" name="">
+          <a:extLst>
+            <a:ext uri="{FF2B5EF4-FFF2-40B4-BE49-F238E27FC236}">
+              <a16:creationId xmlns:a16="http://schemas.microsoft.com/office/drawing/2014/main" id="{A5973F25-9E59-F19D-CF38-A45FE6DB1224}"/>
+            </a:ext>
+          </a:extLst>
+        </p:cNvPr>
+        <p:cNvGrpSpPr/>
+        <p:nvPr/>
+      </p:nvGrpSpPr>
+      <p:grpSpPr>
+        <a:xfrm>
+          <a:off x="0" y="0"/>
+          <a:ext cx="0" cy="0"/>
+          <a:chOff x="0" y="0"/>
+          <a:chExt cx="0" cy="0"/>
+        </a:xfrm>
+      </p:grpSpPr>
+      <p:sp>
+        <p:nvSpPr>
+          <p:cNvPr id="2" name="Slide Image Placeholder 1">
+            <a:extLst>
+              <a:ext uri="{FF2B5EF4-FFF2-40B4-BE49-F238E27FC236}">
+                <a16:creationId xmlns:a16="http://schemas.microsoft.com/office/drawing/2014/main" id="{A9ABB460-884C-6887-C3CC-860AC2786F68}"/>
+              </a:ext>
+            </a:extLst>
+          </p:cNvPr>
+          <p:cNvSpPr>
+            <a:spLocks noGrp="1" noRot="1" noChangeAspect="1"/>
+          </p:cNvSpPr>
+          <p:nvPr>
+            <p:ph type="sldImg"/>
+          </p:nvPr>
+        </p:nvSpPr>
+        <p:spPr>
+          <a:xfrm>
+            <a:off x="-3943350" y="1143000"/>
+            <a:ext cx="14744700" cy="3086100"/>
+          </a:xfrm>
+        </p:spPr>
+      </p:sp>
+      <p:sp>
+        <p:nvSpPr>
+          <p:cNvPr id="3" name="Notes Placeholder 2">
+            <a:extLst>
+              <a:ext uri="{FF2B5EF4-FFF2-40B4-BE49-F238E27FC236}">
+                <a16:creationId xmlns:a16="http://schemas.microsoft.com/office/drawing/2014/main" id="{5B126A20-2F61-3D39-74D2-39AADAFC01AC}"/>
+              </a:ext>
+            </a:extLst>
+          </p:cNvPr>
+          <p:cNvSpPr>
+            <a:spLocks noGrp="1"/>
+          </p:cNvSpPr>
+          <p:nvPr>
+            <p:ph type="body" idx="1"/>
+          </p:nvPr>
+        </p:nvSpPr>
+        <p:spPr/>
+        <p:txBody>
+          <a:bodyPr/>
+          <a:lstStyle/>
+          <a:p>
+            <a:endParaRPr lang="en-US" dirty="0"/>
+          </a:p>
+        </p:txBody>
+      </p:sp>
+      <p:sp>
+        <p:nvSpPr>
+          <p:cNvPr id="4" name="Slide Number Placeholder 3">
+            <a:extLst>
+              <a:ext uri="{FF2B5EF4-FFF2-40B4-BE49-F238E27FC236}">
+                <a16:creationId xmlns:a16="http://schemas.microsoft.com/office/drawing/2014/main" id="{B19D9AEF-67E7-3160-834A-F2618C196827}"/>
+              </a:ext>
+            </a:extLst>
+          </p:cNvPr>
+          <p:cNvSpPr>
+            <a:spLocks noGrp="1"/>
+          </p:cNvSpPr>
+          <p:nvPr>
+            <p:ph type="sldNum" sz="quarter" idx="5"/>
+          </p:nvPr>
+        </p:nvSpPr>
+        <p:spPr/>
+        <p:txBody>
+          <a:bodyPr/>
+          <a:lstStyle/>
+          <a:p>
+            <a:fld id="{D7CA27ED-346A-4D4F-AD1E-98498D6848B4}" type="slidenum">
+              <a:rPr lang="en-US" smtClean="0"/>
+              <a:t>2</a:t>
+            </a:fld>
+            <a:endParaRPr lang="en-US"/>
+          </a:p>
+        </p:txBody>
+      </p:sp>
+    </p:spTree>
+    <p:extLst>
+      <p:ext uri="{BB962C8B-B14F-4D97-AF65-F5344CB8AC3E}">
+        <p14:creationId xmlns:p14="http://schemas.microsoft.com/office/powerpoint/2010/main" val="3381647382"/>
+      </p:ext>
+    </p:extLst>
+  </p:cSld>
+  <p:clrMapOvr>
+    <a:masterClrMapping/>
+  </p:clrMapOvr>
+</p:notes>
+</file>
+
 <file path=ppt/slideLayouts/slideLayout1.xml><?xml version="1.0" encoding="utf-8"?>
 <p:sldLayout xmlns:a="http://schemas.openxmlformats.org/drawingml/2006/main" xmlns:r="http://schemas.openxmlformats.org/officeDocument/2006/relationships" xmlns:p="http://schemas.openxmlformats.org/presentationml/2006/main" type="title" preserve="1">
   <p:cSld name="Title Slide">
@@ -693,7 +908,7 @@
           <a:p>
             <a:fld id="{0A85FBF7-6189-C04A-8896-44241FF05286}" type="datetimeFigureOut">
               <a:rPr lang="en-US" smtClean="0"/>
-              <a:t>7/31/25</a:t>
+              <a:t>8/22/25</a:t>
             </a:fld>
             <a:endParaRPr lang="en-US"/>
           </a:p>
@@ -863,7 +1078,7 @@
           <a:p>
             <a:fld id="{0A85FBF7-6189-C04A-8896-44241FF05286}" type="datetimeFigureOut">
               <a:rPr lang="en-US" smtClean="0"/>
-              <a:t>7/31/25</a:t>
+              <a:t>8/22/25</a:t>
             </a:fld>
             <a:endParaRPr lang="en-US"/>
           </a:p>
@@ -1043,7 +1258,7 @@
           <a:p>
             <a:fld id="{0A85FBF7-6189-C04A-8896-44241FF05286}" type="datetimeFigureOut">
               <a:rPr lang="en-US" smtClean="0"/>
-              <a:t>7/31/25</a:t>
+              <a:t>8/22/25</a:t>
             </a:fld>
             <a:endParaRPr lang="en-US"/>
           </a:p>
@@ -1213,7 +1428,7 @@
           <a:p>
             <a:fld id="{0A85FBF7-6189-C04A-8896-44241FF05286}" type="datetimeFigureOut">
               <a:rPr lang="en-US" smtClean="0"/>
-              <a:t>7/31/25</a:t>
+              <a:t>8/22/25</a:t>
             </a:fld>
             <a:endParaRPr lang="en-US"/>
           </a:p>
@@ -1459,7 +1674,7 @@
           <a:p>
             <a:fld id="{0A85FBF7-6189-C04A-8896-44241FF05286}" type="datetimeFigureOut">
               <a:rPr lang="en-US" smtClean="0"/>
-              <a:t>7/31/25</a:t>
+              <a:t>8/22/25</a:t>
             </a:fld>
             <a:endParaRPr lang="en-US"/>
           </a:p>
@@ -1691,7 +1906,7 @@
           <a:p>
             <a:fld id="{0A85FBF7-6189-C04A-8896-44241FF05286}" type="datetimeFigureOut">
               <a:rPr lang="en-US" smtClean="0"/>
-              <a:t>7/31/25</a:t>
+              <a:t>8/22/25</a:t>
             </a:fld>
             <a:endParaRPr lang="en-US"/>
           </a:p>
@@ -2058,7 +2273,7 @@
           <a:p>
             <a:fld id="{0A85FBF7-6189-C04A-8896-44241FF05286}" type="datetimeFigureOut">
               <a:rPr lang="en-US" smtClean="0"/>
-              <a:t>7/31/25</a:t>
+              <a:t>8/22/25</a:t>
             </a:fld>
             <a:endParaRPr lang="en-US"/>
           </a:p>
@@ -2176,7 +2391,7 @@
           <a:p>
             <a:fld id="{0A85FBF7-6189-C04A-8896-44241FF05286}" type="datetimeFigureOut">
               <a:rPr lang="en-US" smtClean="0"/>
-              <a:t>7/31/25</a:t>
+              <a:t>8/22/25</a:t>
             </a:fld>
             <a:endParaRPr lang="en-US"/>
           </a:p>
@@ -2271,7 +2486,7 @@
           <a:p>
             <a:fld id="{0A85FBF7-6189-C04A-8896-44241FF05286}" type="datetimeFigureOut">
               <a:rPr lang="en-US" smtClean="0"/>
-              <a:t>7/31/25</a:t>
+              <a:t>8/22/25</a:t>
             </a:fld>
             <a:endParaRPr lang="en-US"/>
           </a:p>
@@ -2548,7 +2763,7 @@
           <a:p>
             <a:fld id="{0A85FBF7-6189-C04A-8896-44241FF05286}" type="datetimeFigureOut">
               <a:rPr lang="en-US" smtClean="0"/>
-              <a:t>7/31/25</a:t>
+              <a:t>8/22/25</a:t>
             </a:fld>
             <a:endParaRPr lang="en-US"/>
           </a:p>
@@ -2805,7 +3020,7 @@
           <a:p>
             <a:fld id="{0A85FBF7-6189-C04A-8896-44241FF05286}" type="datetimeFigureOut">
               <a:rPr lang="en-US" smtClean="0"/>
-              <a:t>7/31/25</a:t>
+              <a:t>8/22/25</a:t>
             </a:fld>
             <a:endParaRPr lang="en-US"/>
           </a:p>
@@ -3018,7 +3233,7 @@
           <a:p>
             <a:fld id="{0A85FBF7-6189-C04A-8896-44241FF05286}" type="datetimeFigureOut">
               <a:rPr lang="en-US" smtClean="0"/>
-              <a:t>7/31/25</a:t>
+              <a:t>8/22/25</a:t>
             </a:fld>
             <a:endParaRPr lang="en-US"/>
           </a:p>
@@ -3453,8 +3668,8 @@
           </a:prstGeom>
         </p:spPr>
       </p:pic>
-      <mc:AlternateContent xmlns:mc="http://schemas.openxmlformats.org/markup-compatibility/2006">
-        <mc:Choice xmlns:a14="http://schemas.microsoft.com/office/drawing/2010/main" Requires="a14">
+      <mc:AlternateContent xmlns:mc="http://schemas.openxmlformats.org/markup-compatibility/2006" xmlns:a14="http://schemas.microsoft.com/office/drawing/2010/main">
+        <mc:Choice Requires="a14">
           <p:sp>
             <p:nvSpPr>
               <p:cNvPr id="120" name="Equation">
@@ -3663,7 +3878,7 @@
             </p:txBody>
           </p:sp>
         </mc:Choice>
-        <mc:Fallback>
+        <mc:Fallback xmlns="">
           <p:sp>
             <p:nvSpPr>
               <p:cNvPr id="120" name="Equation">
@@ -3711,8 +3926,8 @@
           </p:sp>
         </mc:Fallback>
       </mc:AlternateContent>
-      <mc:AlternateContent xmlns:mc="http://schemas.openxmlformats.org/markup-compatibility/2006">
-        <mc:Choice xmlns:a14="http://schemas.microsoft.com/office/drawing/2010/main" Requires="a14">
+      <mc:AlternateContent xmlns:mc="http://schemas.openxmlformats.org/markup-compatibility/2006" xmlns:a14="http://schemas.microsoft.com/office/drawing/2010/main">
+        <mc:Choice Requires="a14">
           <p:sp>
             <p:nvSpPr>
               <p:cNvPr id="121" name="Equation">
@@ -3943,7 +4158,7 @@
             </p:txBody>
           </p:sp>
         </mc:Choice>
-        <mc:Fallback>
+        <mc:Fallback xmlns="">
           <p:sp>
             <p:nvSpPr>
               <p:cNvPr id="121" name="Equation">
@@ -3991,8 +4206,8 @@
           </p:sp>
         </mc:Fallback>
       </mc:AlternateContent>
-      <mc:AlternateContent xmlns:mc="http://schemas.openxmlformats.org/markup-compatibility/2006">
-        <mc:Choice xmlns:a14="http://schemas.microsoft.com/office/drawing/2010/main" Requires="a14">
+      <mc:AlternateContent xmlns:mc="http://schemas.openxmlformats.org/markup-compatibility/2006" xmlns:a14="http://schemas.microsoft.com/office/drawing/2010/main">
+        <mc:Choice Requires="a14">
           <p:sp>
             <p:nvSpPr>
               <p:cNvPr id="122" name="Equation">
@@ -4342,7 +4557,7 @@
             </p:txBody>
           </p:sp>
         </mc:Choice>
-        <mc:Fallback>
+        <mc:Fallback xmlns="">
           <p:sp>
             <p:nvSpPr>
               <p:cNvPr id="122" name="Equation">
@@ -5592,6 +5807,2387 @@
     <p:extLst>
       <p:ext uri="{BB962C8B-B14F-4D97-AF65-F5344CB8AC3E}">
         <p14:creationId xmlns:p14="http://schemas.microsoft.com/office/powerpoint/2010/main" val="1845256045"/>
+      </p:ext>
+    </p:extLst>
+  </p:cSld>
+  <p:clrMapOvr>
+    <a:masterClrMapping/>
+  </p:clrMapOvr>
+</p:sld>
+</file>
+
+<file path=ppt/slides/slide2.xml><?xml version="1.0" encoding="utf-8"?>
+<p:sld xmlns:a="http://schemas.openxmlformats.org/drawingml/2006/main" xmlns:r="http://schemas.openxmlformats.org/officeDocument/2006/relationships" xmlns:p="http://schemas.openxmlformats.org/presentationml/2006/main">
+  <p:cSld>
+    <p:spTree>
+      <p:nvGrpSpPr>
+        <p:cNvPr id="1" name="">
+          <a:extLst>
+            <a:ext uri="{FF2B5EF4-FFF2-40B4-BE49-F238E27FC236}">
+              <a16:creationId xmlns:a16="http://schemas.microsoft.com/office/drawing/2014/main" id="{F9B5158A-A10A-FE0A-083B-AB4E742BECB9}"/>
+            </a:ext>
+          </a:extLst>
+        </p:cNvPr>
+        <p:cNvGrpSpPr/>
+        <p:nvPr/>
+      </p:nvGrpSpPr>
+      <p:grpSpPr>
+        <a:xfrm>
+          <a:off x="0" y="0"/>
+          <a:ext cx="0" cy="0"/>
+          <a:chOff x="0" y="0"/>
+          <a:chExt cx="0" cy="0"/>
+        </a:xfrm>
+      </p:grpSpPr>
+      <p:pic>
+        <p:nvPicPr>
+          <p:cNvPr id="119" name="Picture 118">
+            <a:extLst>
+              <a:ext uri="{FF2B5EF4-FFF2-40B4-BE49-F238E27FC236}">
+                <a16:creationId xmlns:a16="http://schemas.microsoft.com/office/drawing/2014/main" id="{B427A56D-FF59-8C55-12F4-F412E06CE9EA}"/>
+              </a:ext>
+            </a:extLst>
+          </p:cNvPr>
+          <p:cNvPicPr>
+            <a:picLocks noChangeAspect="1"/>
+          </p:cNvPicPr>
+          <p:nvPr/>
+        </p:nvPicPr>
+        <p:blipFill>
+          <a:blip r:embed="rId3"/>
+          <a:stretch>
+            <a:fillRect/>
+          </a:stretch>
+        </p:blipFill>
+        <p:spPr>
+          <a:xfrm>
+            <a:off x="128754" y="225583"/>
+            <a:ext cx="15274985" cy="2984361"/>
+          </a:xfrm>
+          <a:prstGeom prst="rect">
+            <a:avLst/>
+          </a:prstGeom>
+        </p:spPr>
+      </p:pic>
+      <mc:AlternateContent xmlns:mc="http://schemas.openxmlformats.org/markup-compatibility/2006" xmlns:a14="http://schemas.microsoft.com/office/drawing/2010/main">
+        <mc:Choice Requires="a14">
+          <p:sp>
+            <p:nvSpPr>
+              <p:cNvPr id="120" name="Equation">
+                <a:extLst>
+                  <a:ext uri="{FF2B5EF4-FFF2-40B4-BE49-F238E27FC236}">
+                    <a16:creationId xmlns:a16="http://schemas.microsoft.com/office/drawing/2014/main" id="{8AF14729-67E8-7915-395E-A3C17311D9CE}"/>
+                  </a:ext>
+                </a:extLst>
+              </p:cNvPr>
+              <p:cNvSpPr txBox="1"/>
+              <p:nvPr/>
+            </p:nvSpPr>
+            <p:spPr>
+              <a:xfrm>
+                <a:off x="8259889" y="6950082"/>
+                <a:ext cx="2765116" cy="307777"/>
+              </a:xfrm>
+              <a:prstGeom prst="rect">
+                <a:avLst/>
+              </a:prstGeom>
+              <a:ln w="12700">
+                <a:miter lim="400000"/>
+              </a:ln>
+            </p:spPr>
+            <p:txBody>
+              <a:bodyPr wrap="none" lIns="0" tIns="0" rIns="0" bIns="0">
+                <a:spAutoFit/>
+              </a:bodyPr>
+              <a:lstStyle/>
+              <a:p>
+                <a:pPr latinLnBrk="1">
+                  <a:defRPr sz="1800"/>
+                </a:pPr>
+                <a14:m>
+                  <m:oMathPara xmlns:m="http://schemas.openxmlformats.org/officeDocument/2006/math">
+                    <m:oMathParaPr>
+                      <m:jc m:val="centerGroup"/>
+                    </m:oMathParaPr>
+                    <m:oMath xmlns:m="http://schemas.openxmlformats.org/officeDocument/2006/math">
+                      <m:r>
+                        <a:rPr sz="2000" i="1">
+                          <a:solidFill>
+                            <a:srgbClr val="000000"/>
+                          </a:solidFill>
+                          <a:latin typeface="Cambria Math" panose="02040503050406030204" pitchFamily="18" charset="0"/>
+                        </a:rPr>
+                        <m:t>𝑃</m:t>
+                      </m:r>
+                      <m:r>
+                        <a:rPr sz="2000" i="1">
+                          <a:solidFill>
+                            <a:srgbClr val="000000"/>
+                          </a:solidFill>
+                          <a:latin typeface="Cambria Math" panose="02040503050406030204" pitchFamily="18" charset="0"/>
+                        </a:rPr>
+                        <m:t>(</m:t>
+                      </m:r>
+                      <m:sSub>
+                        <m:sSubPr>
+                          <m:ctrlPr>
+                            <a:rPr sz="2000" i="1">
+                              <a:solidFill>
+                                <a:srgbClr val="000000"/>
+                              </a:solidFill>
+                              <a:latin typeface="Cambria Math" panose="02040503050406030204" pitchFamily="18" charset="0"/>
+                            </a:rPr>
+                          </m:ctrlPr>
+                        </m:sSubPr>
+                        <m:e>
+                          <m:r>
+                            <a:rPr sz="2000" i="1">
+                              <a:solidFill>
+                                <a:srgbClr val="000000"/>
+                              </a:solidFill>
+                              <a:latin typeface="Cambria Math" panose="02040503050406030204" pitchFamily="18" charset="0"/>
+                            </a:rPr>
+                            <m:t>𝐱</m:t>
+                          </m:r>
+                        </m:e>
+                        <m:sub>
+                          <m:r>
+                            <a:rPr sz="2000" i="1">
+                              <a:solidFill>
+                                <a:srgbClr val="000000"/>
+                              </a:solidFill>
+                              <a:latin typeface="Cambria Math" panose="02040503050406030204" pitchFamily="18" charset="0"/>
+                            </a:rPr>
+                            <m:t>𝑖</m:t>
+                          </m:r>
+                        </m:sub>
+                      </m:sSub>
+                      <m:r>
+                        <a:rPr sz="2000" i="1">
+                          <a:solidFill>
+                            <a:srgbClr val="000000"/>
+                          </a:solidFill>
+                          <a:latin typeface="Cambria Math" panose="02040503050406030204" pitchFamily="18" charset="0"/>
+                        </a:rPr>
+                        <m:t>)∝</m:t>
+                      </m:r>
+                      <m:r>
+                        <m:rPr>
+                          <m:sty m:val="p"/>
+                        </m:rPr>
+                        <a:rPr sz="2000" i="1">
+                          <a:solidFill>
+                            <a:srgbClr val="000000"/>
+                          </a:solidFill>
+                          <a:latin typeface="Cambria Math" panose="02040503050406030204" pitchFamily="18" charset="0"/>
+                        </a:rPr>
+                        <m:t>exp</m:t>
+                      </m:r>
+                      <m:r>
+                        <a:rPr sz="2000" i="1">
+                          <a:solidFill>
+                            <a:srgbClr val="000000"/>
+                          </a:solidFill>
+                          <a:latin typeface="Cambria Math" panose="02040503050406030204" pitchFamily="18" charset="0"/>
+                        </a:rPr>
+                        <m:t>(</m:t>
+                      </m:r>
+                      <m:r>
+                        <a:rPr sz="2000" i="1">
+                          <a:solidFill>
+                            <a:srgbClr val="000000"/>
+                          </a:solidFill>
+                          <a:latin typeface="Cambria Math" panose="02040503050406030204" pitchFamily="18" charset="0"/>
+                        </a:rPr>
+                        <m:t>𝑈𝐶𝐵</m:t>
+                      </m:r>
+                      <m:r>
+                        <a:rPr sz="2000" i="1">
+                          <a:solidFill>
+                            <a:srgbClr val="000000"/>
+                          </a:solidFill>
+                          <a:latin typeface="Cambria Math" panose="02040503050406030204" pitchFamily="18" charset="0"/>
+                        </a:rPr>
+                        <m:t>(</m:t>
+                      </m:r>
+                      <m:sSub>
+                        <m:sSubPr>
+                          <m:ctrlPr>
+                            <a:rPr sz="2000" i="1">
+                              <a:solidFill>
+                                <a:srgbClr val="000000"/>
+                              </a:solidFill>
+                              <a:latin typeface="Cambria Math" panose="02040503050406030204" pitchFamily="18" charset="0"/>
+                            </a:rPr>
+                          </m:ctrlPr>
+                        </m:sSubPr>
+                        <m:e>
+                          <m:r>
+                            <a:rPr sz="2000" i="1">
+                              <a:solidFill>
+                                <a:srgbClr val="000000"/>
+                              </a:solidFill>
+                              <a:latin typeface="Cambria Math" panose="02040503050406030204" pitchFamily="18" charset="0"/>
+                            </a:rPr>
+                            <m:t>𝐱</m:t>
+                          </m:r>
+                        </m:e>
+                        <m:sub>
+                          <m:r>
+                            <a:rPr sz="2000" i="1">
+                              <a:solidFill>
+                                <a:srgbClr val="000000"/>
+                              </a:solidFill>
+                              <a:latin typeface="Cambria Math" panose="02040503050406030204" pitchFamily="18" charset="0"/>
+                            </a:rPr>
+                            <m:t>𝑖</m:t>
+                          </m:r>
+                        </m:sub>
+                      </m:sSub>
+                      <m:r>
+                        <a:rPr sz="2000" i="1">
+                          <a:solidFill>
+                            <a:srgbClr val="000000"/>
+                          </a:solidFill>
+                          <a:latin typeface="Cambria Math" panose="02040503050406030204" pitchFamily="18" charset="0"/>
+                        </a:rPr>
+                        <m:t>)/</m:t>
+                      </m:r>
+                      <m:r>
+                        <a:rPr sz="2000" i="1">
+                          <a:solidFill>
+                            <a:srgbClr val="000000"/>
+                          </a:solidFill>
+                          <a:latin typeface="Cambria Math" panose="02040503050406030204" pitchFamily="18" charset="0"/>
+                        </a:rPr>
+                        <m:t>𝜏</m:t>
+                      </m:r>
+                      <m:r>
+                        <a:rPr sz="2000" i="1">
+                          <a:solidFill>
+                            <a:srgbClr val="000000"/>
+                          </a:solidFill>
+                          <a:latin typeface="Cambria Math" panose="02040503050406030204" pitchFamily="18" charset="0"/>
+                        </a:rPr>
+                        <m:t>)</m:t>
+                      </m:r>
+                    </m:oMath>
+                  </m:oMathPara>
+                </a14:m>
+                <a:endParaRPr sz="2000" dirty="0"/>
+              </a:p>
+            </p:txBody>
+          </p:sp>
+        </mc:Choice>
+        <mc:Fallback xmlns="">
+          <p:sp>
+            <p:nvSpPr>
+              <p:cNvPr id="120" name="Equation">
+                <a:extLst>
+                  <a:ext uri="{FF2B5EF4-FFF2-40B4-BE49-F238E27FC236}">
+                    <a16:creationId xmlns:a16="http://schemas.microsoft.com/office/drawing/2014/main" id="{8C33B5BE-93B6-EE74-FF38-53C76DA0C468}"/>
+                  </a:ext>
+                </a:extLst>
+              </p:cNvPr>
+              <p:cNvSpPr txBox="1">
+                <a:spLocks noRot="1" noChangeAspect="1" noMove="1" noResize="1" noEditPoints="1" noAdjustHandles="1" noChangeArrowheads="1" noChangeShapeType="1" noTextEdit="1"/>
+              </p:cNvSpPr>
+              <p:nvPr/>
+            </p:nvSpPr>
+            <p:spPr>
+              <a:xfrm>
+                <a:off x="8259889" y="6950082"/>
+                <a:ext cx="2765116" cy="307777"/>
+              </a:xfrm>
+              <a:prstGeom prst="rect">
+                <a:avLst/>
+              </a:prstGeom>
+              <a:blipFill>
+                <a:blip r:embed="rId4"/>
+                <a:stretch>
+                  <a:fillRect l="-1826" r="-2740" b="-32000"/>
+                </a:stretch>
+              </a:blipFill>
+              <a:ln w="12700">
+                <a:miter lim="400000"/>
+              </a:ln>
+            </p:spPr>
+            <p:txBody>
+              <a:bodyPr/>
+              <a:lstStyle/>
+              <a:p>
+                <a:r>
+                  <a:rPr lang="en-US">
+                    <a:noFill/>
+                  </a:rPr>
+                  <a:t> </a:t>
+                </a:r>
+              </a:p>
+            </p:txBody>
+          </p:sp>
+        </mc:Fallback>
+      </mc:AlternateContent>
+      <mc:AlternateContent xmlns:mc="http://schemas.openxmlformats.org/markup-compatibility/2006" xmlns:a14="http://schemas.microsoft.com/office/drawing/2010/main">
+        <mc:Choice Requires="a14">
+          <p:sp>
+            <p:nvSpPr>
+              <p:cNvPr id="121" name="Equation">
+                <a:extLst>
+                  <a:ext uri="{FF2B5EF4-FFF2-40B4-BE49-F238E27FC236}">
+                    <a16:creationId xmlns:a16="http://schemas.microsoft.com/office/drawing/2014/main" id="{6F8E15FC-4754-DF0D-AA05-4C89B7C8946A}"/>
+                  </a:ext>
+                </a:extLst>
+              </p:cNvPr>
+              <p:cNvSpPr txBox="1"/>
+              <p:nvPr/>
+            </p:nvSpPr>
+            <p:spPr>
+              <a:xfrm>
+                <a:off x="5106968" y="6950082"/>
+                <a:ext cx="2969787" cy="307777"/>
+              </a:xfrm>
+              <a:prstGeom prst="rect">
+                <a:avLst/>
+              </a:prstGeom>
+              <a:ln w="12700">
+                <a:miter lim="400000"/>
+              </a:ln>
+            </p:spPr>
+            <p:txBody>
+              <a:bodyPr wrap="none" lIns="0" tIns="0" rIns="0" bIns="0">
+                <a:spAutoFit/>
+              </a:bodyPr>
+              <a:lstStyle/>
+              <a:p>
+                <a:pPr latinLnBrk="1">
+                  <a:defRPr sz="1800"/>
+                </a:pPr>
+                <a14:m>
+                  <m:oMathPara xmlns:m="http://schemas.openxmlformats.org/officeDocument/2006/math">
+                    <m:oMathParaPr>
+                      <m:jc m:val="centerGroup"/>
+                    </m:oMathParaPr>
+                    <m:oMath xmlns:m="http://schemas.openxmlformats.org/officeDocument/2006/math">
+                      <m:r>
+                        <a:rPr sz="2000" i="1">
+                          <a:solidFill>
+                            <a:srgbClr val="000000"/>
+                          </a:solidFill>
+                          <a:latin typeface="Cambria Math" panose="02040503050406030204" pitchFamily="18" charset="0"/>
+                        </a:rPr>
+                        <m:t>𝑈𝐶𝐵</m:t>
+                      </m:r>
+                      <m:r>
+                        <a:rPr sz="2000" i="1">
+                          <a:solidFill>
+                            <a:srgbClr val="000000"/>
+                          </a:solidFill>
+                          <a:latin typeface="Cambria Math" panose="02040503050406030204" pitchFamily="18" charset="0"/>
+                        </a:rPr>
+                        <m:t>(</m:t>
+                      </m:r>
+                      <m:sSub>
+                        <m:sSubPr>
+                          <m:ctrlPr>
+                            <a:rPr sz="2000" i="1">
+                              <a:solidFill>
+                                <a:srgbClr val="000000"/>
+                              </a:solidFill>
+                              <a:latin typeface="Cambria Math" panose="02040503050406030204" pitchFamily="18" charset="0"/>
+                            </a:rPr>
+                          </m:ctrlPr>
+                        </m:sSubPr>
+                        <m:e>
+                          <m:r>
+                            <a:rPr sz="2000" i="1">
+                              <a:solidFill>
+                                <a:srgbClr val="000000"/>
+                              </a:solidFill>
+                              <a:latin typeface="Cambria Math" panose="02040503050406030204" pitchFamily="18" charset="0"/>
+                            </a:rPr>
+                            <m:t>𝐱</m:t>
+                          </m:r>
+                        </m:e>
+                        <m:sub>
+                          <m:r>
+                            <a:rPr sz="2000" i="1">
+                              <a:solidFill>
+                                <a:srgbClr val="000000"/>
+                              </a:solidFill>
+                              <a:latin typeface="Cambria Math" panose="02040503050406030204" pitchFamily="18" charset="0"/>
+                            </a:rPr>
+                            <m:t>𝑖</m:t>
+                          </m:r>
+                        </m:sub>
+                      </m:sSub>
+                      <m:r>
+                        <a:rPr sz="2000" i="1">
+                          <a:solidFill>
+                            <a:srgbClr val="000000"/>
+                          </a:solidFill>
+                          <a:latin typeface="Cambria Math" panose="02040503050406030204" pitchFamily="18" charset="0"/>
+                        </a:rPr>
+                        <m:t>)=</m:t>
+                      </m:r>
+                      <m:r>
+                        <a:rPr sz="2000" i="1">
+                          <a:solidFill>
+                            <a:srgbClr val="000000"/>
+                          </a:solidFill>
+                          <a:latin typeface="Cambria Math" panose="02040503050406030204" pitchFamily="18" charset="0"/>
+                        </a:rPr>
+                        <m:t>𝜇</m:t>
+                      </m:r>
+                      <m:r>
+                        <a:rPr sz="2000" i="1">
+                          <a:solidFill>
+                            <a:srgbClr val="000000"/>
+                          </a:solidFill>
+                          <a:latin typeface="Cambria Math" panose="02040503050406030204" pitchFamily="18" charset="0"/>
+                        </a:rPr>
+                        <m:t>(</m:t>
+                      </m:r>
+                      <m:sSub>
+                        <m:sSubPr>
+                          <m:ctrlPr>
+                            <a:rPr sz="2000" i="1">
+                              <a:solidFill>
+                                <a:srgbClr val="000000"/>
+                              </a:solidFill>
+                              <a:latin typeface="Cambria Math" panose="02040503050406030204" pitchFamily="18" charset="0"/>
+                            </a:rPr>
+                          </m:ctrlPr>
+                        </m:sSubPr>
+                        <m:e>
+                          <m:r>
+                            <a:rPr sz="2000" i="1">
+                              <a:solidFill>
+                                <a:srgbClr val="000000"/>
+                              </a:solidFill>
+                              <a:latin typeface="Cambria Math" panose="02040503050406030204" pitchFamily="18" charset="0"/>
+                            </a:rPr>
+                            <m:t>𝐱</m:t>
+                          </m:r>
+                        </m:e>
+                        <m:sub>
+                          <m:r>
+                            <a:rPr sz="2000" i="1">
+                              <a:solidFill>
+                                <a:srgbClr val="000000"/>
+                              </a:solidFill>
+                              <a:latin typeface="Cambria Math" panose="02040503050406030204" pitchFamily="18" charset="0"/>
+                            </a:rPr>
+                            <m:t>𝑖</m:t>
+                          </m:r>
+                        </m:sub>
+                      </m:sSub>
+                      <m:r>
+                        <a:rPr sz="2000" i="1">
+                          <a:solidFill>
+                            <a:srgbClr val="000000"/>
+                          </a:solidFill>
+                          <a:latin typeface="Cambria Math" panose="02040503050406030204" pitchFamily="18" charset="0"/>
+                        </a:rPr>
+                        <m:t>)+</m:t>
+                      </m:r>
+                      <m:r>
+                        <a:rPr sz="2000" i="1">
+                          <a:solidFill>
+                            <a:srgbClr val="000000"/>
+                          </a:solidFill>
+                          <a:latin typeface="Cambria Math" panose="02040503050406030204" pitchFamily="18" charset="0"/>
+                        </a:rPr>
+                        <m:t>𝛽𝜎</m:t>
+                      </m:r>
+                      <m:r>
+                        <a:rPr sz="2000" i="1">
+                          <a:solidFill>
+                            <a:srgbClr val="000000"/>
+                          </a:solidFill>
+                          <a:latin typeface="Cambria Math" panose="02040503050406030204" pitchFamily="18" charset="0"/>
+                        </a:rPr>
+                        <m:t>(</m:t>
+                      </m:r>
+                      <m:sSub>
+                        <m:sSubPr>
+                          <m:ctrlPr>
+                            <a:rPr sz="2000" i="1">
+                              <a:solidFill>
+                                <a:srgbClr val="000000"/>
+                              </a:solidFill>
+                              <a:latin typeface="Cambria Math" panose="02040503050406030204" pitchFamily="18" charset="0"/>
+                            </a:rPr>
+                          </m:ctrlPr>
+                        </m:sSubPr>
+                        <m:e>
+                          <m:r>
+                            <a:rPr sz="2000" i="1">
+                              <a:solidFill>
+                                <a:srgbClr val="000000"/>
+                              </a:solidFill>
+                              <a:latin typeface="Cambria Math" panose="02040503050406030204" pitchFamily="18" charset="0"/>
+                            </a:rPr>
+                            <m:t>𝐱</m:t>
+                          </m:r>
+                        </m:e>
+                        <m:sub>
+                          <m:r>
+                            <a:rPr sz="2000" i="1">
+                              <a:solidFill>
+                                <a:srgbClr val="000000"/>
+                              </a:solidFill>
+                              <a:latin typeface="Cambria Math" panose="02040503050406030204" pitchFamily="18" charset="0"/>
+                            </a:rPr>
+                            <m:t>𝑖</m:t>
+                          </m:r>
+                        </m:sub>
+                      </m:sSub>
+                      <m:r>
+                        <a:rPr sz="2000" i="1">
+                          <a:solidFill>
+                            <a:srgbClr val="000000"/>
+                          </a:solidFill>
+                          <a:latin typeface="Cambria Math" panose="02040503050406030204" pitchFamily="18" charset="0"/>
+                        </a:rPr>
+                        <m:t>)</m:t>
+                      </m:r>
+                    </m:oMath>
+                  </m:oMathPara>
+                </a14:m>
+                <a:endParaRPr sz="2000" dirty="0"/>
+              </a:p>
+            </p:txBody>
+          </p:sp>
+        </mc:Choice>
+        <mc:Fallback xmlns="">
+          <p:sp>
+            <p:nvSpPr>
+              <p:cNvPr id="121" name="Equation">
+                <a:extLst>
+                  <a:ext uri="{FF2B5EF4-FFF2-40B4-BE49-F238E27FC236}">
+                    <a16:creationId xmlns:a16="http://schemas.microsoft.com/office/drawing/2014/main" id="{53E71FA6-7436-D14E-30B7-7EE8E2885AA4}"/>
+                  </a:ext>
+                </a:extLst>
+              </p:cNvPr>
+              <p:cNvSpPr txBox="1">
+                <a:spLocks noRot="1" noChangeAspect="1" noMove="1" noResize="1" noEditPoints="1" noAdjustHandles="1" noChangeArrowheads="1" noChangeShapeType="1" noTextEdit="1"/>
+              </p:cNvSpPr>
+              <p:nvPr/>
+            </p:nvSpPr>
+            <p:spPr>
+              <a:xfrm>
+                <a:off x="5106968" y="6950082"/>
+                <a:ext cx="2969787" cy="307777"/>
+              </a:xfrm>
+              <a:prstGeom prst="rect">
+                <a:avLst/>
+              </a:prstGeom>
+              <a:blipFill>
+                <a:blip r:embed="rId5"/>
+                <a:stretch>
+                  <a:fillRect l="-1709" r="-2564" b="-32000"/>
+                </a:stretch>
+              </a:blipFill>
+              <a:ln w="12700">
+                <a:miter lim="400000"/>
+              </a:ln>
+            </p:spPr>
+            <p:txBody>
+              <a:bodyPr/>
+              <a:lstStyle/>
+              <a:p>
+                <a:r>
+                  <a:rPr lang="en-US">
+                    <a:noFill/>
+                  </a:rPr>
+                  <a:t> </a:t>
+                </a:r>
+              </a:p>
+            </p:txBody>
+          </p:sp>
+        </mc:Fallback>
+      </mc:AlternateContent>
+      <mc:AlternateContent xmlns:mc="http://schemas.openxmlformats.org/markup-compatibility/2006" xmlns:a14="http://schemas.microsoft.com/office/drawing/2010/main">
+        <mc:Choice Requires="a14">
+          <p:sp>
+            <p:nvSpPr>
+              <p:cNvPr id="122" name="Equation">
+                <a:extLst>
+                  <a:ext uri="{FF2B5EF4-FFF2-40B4-BE49-F238E27FC236}">
+                    <a16:creationId xmlns:a16="http://schemas.microsoft.com/office/drawing/2014/main" id="{6126897F-53AA-00C9-7F29-65BD125AE19C}"/>
+                  </a:ext>
+                </a:extLst>
+              </p:cNvPr>
+              <p:cNvSpPr txBox="1"/>
+              <p:nvPr/>
+            </p:nvSpPr>
+            <p:spPr>
+              <a:xfrm>
+                <a:off x="704429" y="6742703"/>
+                <a:ext cx="3647922" cy="697692"/>
+              </a:xfrm>
+              <a:prstGeom prst="rect">
+                <a:avLst/>
+              </a:prstGeom>
+              <a:ln w="12700">
+                <a:miter lim="400000"/>
+              </a:ln>
+            </p:spPr>
+            <p:txBody>
+              <a:bodyPr wrap="none" lIns="0" tIns="0" rIns="0" bIns="0">
+                <a:spAutoFit/>
+              </a:bodyPr>
+              <a:lstStyle/>
+              <a:p>
+                <a:pPr latinLnBrk="1">
+                  <a:defRPr sz="1800"/>
+                </a:pPr>
+                <a14:m>
+                  <m:oMathPara xmlns:m="http://schemas.openxmlformats.org/officeDocument/2006/math">
+                    <m:oMathParaPr>
+                      <m:jc m:val="centerGroup"/>
+                    </m:oMathParaPr>
+                    <m:oMath xmlns:m="http://schemas.openxmlformats.org/officeDocument/2006/math">
+                      <m:sSub>
+                        <m:sSubPr>
+                          <m:ctrlPr>
+                            <a:rPr sz="2000" i="1">
+                              <a:solidFill>
+                                <a:srgbClr val="000000"/>
+                              </a:solidFill>
+                              <a:latin typeface="Cambria Math" panose="02040503050406030204" pitchFamily="18" charset="0"/>
+                            </a:rPr>
+                          </m:ctrlPr>
+                        </m:sSubPr>
+                        <m:e>
+                          <m:r>
+                            <a:rPr sz="2000" i="1">
+                              <a:solidFill>
+                                <a:srgbClr val="000000"/>
+                              </a:solidFill>
+                              <a:latin typeface="Cambria Math" panose="02040503050406030204" pitchFamily="18" charset="0"/>
+                            </a:rPr>
+                            <m:t>𝑘</m:t>
+                          </m:r>
+                        </m:e>
+                        <m:sub>
+                          <m:r>
+                            <a:rPr sz="2000" i="1">
+                              <a:solidFill>
+                                <a:srgbClr val="000000"/>
+                              </a:solidFill>
+                              <a:latin typeface="Cambria Math" panose="02040503050406030204" pitchFamily="18" charset="0"/>
+                            </a:rPr>
+                            <m:t>𝑅𝐵𝐹</m:t>
+                          </m:r>
+                        </m:sub>
+                      </m:sSub>
+                      <m:r>
+                        <a:rPr sz="2000" i="1">
+                          <a:solidFill>
+                            <a:srgbClr val="000000"/>
+                          </a:solidFill>
+                          <a:latin typeface="Cambria Math" panose="02040503050406030204" pitchFamily="18" charset="0"/>
+                        </a:rPr>
+                        <m:t>(</m:t>
+                      </m:r>
+                      <m:r>
+                        <a:rPr sz="2000" i="1">
+                          <a:solidFill>
+                            <a:srgbClr val="000000"/>
+                          </a:solidFill>
+                          <a:latin typeface="Cambria Math" panose="02040503050406030204" pitchFamily="18" charset="0"/>
+                        </a:rPr>
+                        <m:t>𝐱</m:t>
+                      </m:r>
+                      <m:r>
+                        <a:rPr sz="2000" i="1">
+                          <a:solidFill>
+                            <a:srgbClr val="000000"/>
+                          </a:solidFill>
+                          <a:latin typeface="Cambria Math" panose="02040503050406030204" pitchFamily="18" charset="0"/>
+                        </a:rPr>
+                        <m:t>,</m:t>
+                      </m:r>
+                      <m:sSup>
+                        <m:sSupPr>
+                          <m:ctrlPr>
+                            <a:rPr sz="2000" i="1">
+                              <a:solidFill>
+                                <a:srgbClr val="000000"/>
+                              </a:solidFill>
+                              <a:latin typeface="Cambria Math" panose="02040503050406030204" pitchFamily="18" charset="0"/>
+                            </a:rPr>
+                          </m:ctrlPr>
+                        </m:sSupPr>
+                        <m:e>
+                          <m:r>
+                            <a:rPr sz="2000" i="1">
+                              <a:solidFill>
+                                <a:srgbClr val="000000"/>
+                              </a:solidFill>
+                              <a:latin typeface="Cambria Math" panose="02040503050406030204" pitchFamily="18" charset="0"/>
+                            </a:rPr>
+                            <m:t>𝐱</m:t>
+                          </m:r>
+                        </m:e>
+                        <m:sup>
+                          <m:r>
+                            <a:rPr sz="2000" i="1">
+                              <a:solidFill>
+                                <a:srgbClr val="000000"/>
+                              </a:solidFill>
+                              <a:latin typeface="Cambria Math" panose="02040503050406030204" pitchFamily="18" charset="0"/>
+                            </a:rPr>
+                            <m:t>′</m:t>
+                          </m:r>
+                        </m:sup>
+                      </m:sSup>
+                      <m:r>
+                        <a:rPr sz="2000" i="1">
+                          <a:solidFill>
+                            <a:srgbClr val="000000"/>
+                          </a:solidFill>
+                          <a:latin typeface="Cambria Math" panose="02040503050406030204" pitchFamily="18" charset="0"/>
+                        </a:rPr>
+                        <m:t>)=</m:t>
+                      </m:r>
+                      <m:r>
+                        <m:rPr>
+                          <m:sty m:val="p"/>
+                        </m:rPr>
+                        <a:rPr sz="2000" i="1">
+                          <a:solidFill>
+                            <a:srgbClr val="000000"/>
+                          </a:solidFill>
+                          <a:latin typeface="Cambria Math" panose="02040503050406030204" pitchFamily="18" charset="0"/>
+                        </a:rPr>
+                        <m:t>exp</m:t>
+                      </m:r>
+                      <m:d>
+                        <m:dPr>
+                          <m:ctrlPr>
+                            <a:rPr sz="2000" i="1">
+                              <a:solidFill>
+                                <a:srgbClr val="000000"/>
+                              </a:solidFill>
+                              <a:latin typeface="Cambria Math" panose="02040503050406030204" pitchFamily="18" charset="0"/>
+                            </a:rPr>
+                          </m:ctrlPr>
+                        </m:dPr>
+                        <m:e>
+                          <m:r>
+                            <a:rPr sz="2000" i="1">
+                              <a:solidFill>
+                                <a:srgbClr val="000000"/>
+                              </a:solidFill>
+                              <a:latin typeface="Cambria Math" panose="02040503050406030204" pitchFamily="18" charset="0"/>
+                            </a:rPr>
+                            <m:t>−</m:t>
+                          </m:r>
+                          <m:f>
+                            <m:fPr>
+                              <m:ctrlPr>
+                                <a:rPr sz="2000" i="1">
+                                  <a:solidFill>
+                                    <a:srgbClr val="000000"/>
+                                  </a:solidFill>
+                                  <a:latin typeface="Cambria Math" panose="02040503050406030204" pitchFamily="18" charset="0"/>
+                                </a:rPr>
+                              </m:ctrlPr>
+                            </m:fPr>
+                            <m:num>
+                              <m:r>
+                                <a:rPr sz="2000" i="1">
+                                  <a:solidFill>
+                                    <a:srgbClr val="000000"/>
+                                  </a:solidFill>
+                                  <a:latin typeface="Cambria Math" panose="02040503050406030204" pitchFamily="18" charset="0"/>
+                                </a:rPr>
+                                <m:t>||</m:t>
+                              </m:r>
+                              <m:r>
+                                <a:rPr sz="2000" i="1">
+                                  <a:solidFill>
+                                    <a:srgbClr val="000000"/>
+                                  </a:solidFill>
+                                  <a:latin typeface="Cambria Math" panose="02040503050406030204" pitchFamily="18" charset="0"/>
+                                </a:rPr>
+                                <m:t>𝐱</m:t>
+                              </m:r>
+                              <m:r>
+                                <a:rPr sz="2000" i="1">
+                                  <a:solidFill>
+                                    <a:srgbClr val="000000"/>
+                                  </a:solidFill>
+                                  <a:latin typeface="Cambria Math" panose="02040503050406030204" pitchFamily="18" charset="0"/>
+                                </a:rPr>
+                                <m:t>−</m:t>
+                              </m:r>
+                              <m:sSup>
+                                <m:sSupPr>
+                                  <m:ctrlPr>
+                                    <a:rPr sz="2000" i="1">
+                                      <a:solidFill>
+                                        <a:srgbClr val="000000"/>
+                                      </a:solidFill>
+                                      <a:latin typeface="Cambria Math" panose="02040503050406030204" pitchFamily="18" charset="0"/>
+                                    </a:rPr>
+                                  </m:ctrlPr>
+                                </m:sSupPr>
+                                <m:e>
+                                  <m:r>
+                                    <a:rPr sz="2000" i="1">
+                                      <a:solidFill>
+                                        <a:srgbClr val="000000"/>
+                                      </a:solidFill>
+                                      <a:latin typeface="Cambria Math" panose="02040503050406030204" pitchFamily="18" charset="0"/>
+                                    </a:rPr>
+                                    <m:t>𝐱</m:t>
+                                  </m:r>
+                                </m:e>
+                                <m:sup>
+                                  <m:r>
+                                    <a:rPr sz="2000" i="1">
+                                      <a:solidFill>
+                                        <a:srgbClr val="000000"/>
+                                      </a:solidFill>
+                                      <a:latin typeface="Cambria Math" panose="02040503050406030204" pitchFamily="18" charset="0"/>
+                                    </a:rPr>
+                                    <m:t>′</m:t>
+                                  </m:r>
+                                </m:sup>
+                              </m:sSup>
+                              <m:r>
+                                <a:rPr sz="2000" i="1">
+                                  <a:solidFill>
+                                    <a:srgbClr val="000000"/>
+                                  </a:solidFill>
+                                  <a:latin typeface="Cambria Math" panose="02040503050406030204" pitchFamily="18" charset="0"/>
+                                </a:rPr>
+                                <m:t>|</m:t>
+                              </m:r>
+                              <m:sSup>
+                                <m:sSupPr>
+                                  <m:ctrlPr>
+                                    <a:rPr sz="2000" i="1">
+                                      <a:solidFill>
+                                        <a:srgbClr val="000000"/>
+                                      </a:solidFill>
+                                      <a:latin typeface="Cambria Math" panose="02040503050406030204" pitchFamily="18" charset="0"/>
+                                    </a:rPr>
+                                  </m:ctrlPr>
+                                </m:sSupPr>
+                                <m:e>
+                                  <m:r>
+                                    <a:rPr sz="2000" i="1">
+                                      <a:solidFill>
+                                        <a:srgbClr val="000000"/>
+                                      </a:solidFill>
+                                      <a:latin typeface="Cambria Math" panose="02040503050406030204" pitchFamily="18" charset="0"/>
+                                    </a:rPr>
+                                    <m:t>|</m:t>
+                                  </m:r>
+                                </m:e>
+                                <m:sup>
+                                  <m:r>
+                                    <a:rPr sz="2000" i="1">
+                                      <a:solidFill>
+                                        <a:srgbClr val="000000"/>
+                                      </a:solidFill>
+                                      <a:latin typeface="Cambria Math" panose="02040503050406030204" pitchFamily="18" charset="0"/>
+                                    </a:rPr>
+                                    <m:t>2</m:t>
+                                  </m:r>
+                                </m:sup>
+                              </m:sSup>
+                            </m:num>
+                            <m:den>
+                              <m:r>
+                                <a:rPr sz="2000" i="1">
+                                  <a:solidFill>
+                                    <a:srgbClr val="000000"/>
+                                  </a:solidFill>
+                                  <a:latin typeface="Cambria Math" panose="02040503050406030204" pitchFamily="18" charset="0"/>
+                                </a:rPr>
+                                <m:t>2</m:t>
+                              </m:r>
+                              <m:sSup>
+                                <m:sSupPr>
+                                  <m:ctrlPr>
+                                    <a:rPr sz="2000" i="1">
+                                      <a:solidFill>
+                                        <a:srgbClr val="000000"/>
+                                      </a:solidFill>
+                                      <a:latin typeface="Cambria Math" panose="02040503050406030204" pitchFamily="18" charset="0"/>
+                                    </a:rPr>
+                                  </m:ctrlPr>
+                                </m:sSupPr>
+                                <m:e>
+                                  <m:r>
+                                    <a:rPr sz="2000" i="1">
+                                      <a:solidFill>
+                                        <a:srgbClr val="000000"/>
+                                      </a:solidFill>
+                                      <a:latin typeface="Cambria Math" panose="02040503050406030204" pitchFamily="18" charset="0"/>
+                                    </a:rPr>
+                                    <m:t>𝜆</m:t>
+                                  </m:r>
+                                </m:e>
+                                <m:sup>
+                                  <m:r>
+                                    <a:rPr sz="2000" i="1">
+                                      <a:solidFill>
+                                        <a:srgbClr val="000000"/>
+                                      </a:solidFill>
+                                      <a:latin typeface="Cambria Math" panose="02040503050406030204" pitchFamily="18" charset="0"/>
+                                    </a:rPr>
+                                    <m:t>2</m:t>
+                                  </m:r>
+                                </m:sup>
+                              </m:sSup>
+                            </m:den>
+                          </m:f>
+                        </m:e>
+                      </m:d>
+                    </m:oMath>
+                  </m:oMathPara>
+                </a14:m>
+                <a:endParaRPr sz="2000" dirty="0"/>
+              </a:p>
+            </p:txBody>
+          </p:sp>
+        </mc:Choice>
+        <mc:Fallback xmlns="">
+          <p:sp>
+            <p:nvSpPr>
+              <p:cNvPr id="122" name="Equation">
+                <a:extLst>
+                  <a:ext uri="{FF2B5EF4-FFF2-40B4-BE49-F238E27FC236}">
+                    <a16:creationId xmlns:a16="http://schemas.microsoft.com/office/drawing/2014/main" id="{8C2214F3-2BA3-D311-FF4E-A78D60040F0B}"/>
+                  </a:ext>
+                </a:extLst>
+              </p:cNvPr>
+              <p:cNvSpPr txBox="1">
+                <a:spLocks noRot="1" noChangeAspect="1" noMove="1" noResize="1" noEditPoints="1" noAdjustHandles="1" noChangeArrowheads="1" noChangeShapeType="1" noTextEdit="1"/>
+              </p:cNvSpPr>
+              <p:nvPr/>
+            </p:nvSpPr>
+            <p:spPr>
+              <a:xfrm>
+                <a:off x="704429" y="6742703"/>
+                <a:ext cx="3647922" cy="697692"/>
+              </a:xfrm>
+              <a:prstGeom prst="rect">
+                <a:avLst/>
+              </a:prstGeom>
+              <a:blipFill>
+                <a:blip r:embed="rId6"/>
+                <a:stretch>
+                  <a:fillRect l="-1389"/>
+                </a:stretch>
+              </a:blipFill>
+              <a:ln w="12700">
+                <a:miter lim="400000"/>
+              </a:ln>
+            </p:spPr>
+            <p:txBody>
+              <a:bodyPr/>
+              <a:lstStyle/>
+              <a:p>
+                <a:r>
+                  <a:rPr lang="en-US">
+                    <a:noFill/>
+                  </a:rPr>
+                  <a:t> </a:t>
+                </a:r>
+              </a:p>
+            </p:txBody>
+          </p:sp>
+        </mc:Fallback>
+      </mc:AlternateContent>
+      <p:sp>
+        <p:nvSpPr>
+          <p:cNvPr id="123" name="Content Placeholder 2">
+            <a:extLst>
+              <a:ext uri="{FF2B5EF4-FFF2-40B4-BE49-F238E27FC236}">
+                <a16:creationId xmlns:a16="http://schemas.microsoft.com/office/drawing/2014/main" id="{FCFFC8D5-FFB4-BE71-EC88-5B15C6957A0A}"/>
+              </a:ext>
+            </a:extLst>
+          </p:cNvPr>
+          <p:cNvSpPr txBox="1">
+            <a:spLocks/>
+          </p:cNvSpPr>
+          <p:nvPr/>
+        </p:nvSpPr>
+        <p:spPr>
+          <a:xfrm>
+            <a:off x="778601" y="7438382"/>
+            <a:ext cx="4028490" cy="1125422"/>
+          </a:xfrm>
+          <a:prstGeom prst="rect">
+            <a:avLst/>
+          </a:prstGeom>
+        </p:spPr>
+        <p:txBody>
+          <a:bodyPr vert="horz" lIns="91440" tIns="45720" rIns="91440" bIns="45720" rtlCol="0">
+            <a:noAutofit/>
+          </a:bodyPr>
+          <a:lstStyle>
+            <a:lvl1pPr marL="0" indent="0" algn="l" defTabSz="457200" rtl="0" eaLnBrk="1" latinLnBrk="0" hangingPunct="1">
+              <a:spcBef>
+                <a:spcPct val="20000"/>
+              </a:spcBef>
+              <a:buFont typeface="Wingdings" charset="2"/>
+              <a:buNone/>
+              <a:defRPr sz="2200" b="0" i="0" kern="1200">
+                <a:solidFill>
+                  <a:schemeClr val="tx1"/>
+                </a:solidFill>
+                <a:latin typeface="Helvetica Neue Light"/>
+                <a:ea typeface="+mn-ea"/>
+                <a:cs typeface="Helvetica Neue Light"/>
+              </a:defRPr>
+            </a:lvl1pPr>
+            <a:lvl2pPr marL="715963" indent="-373063" algn="l" defTabSz="457200" rtl="0" eaLnBrk="1" latinLnBrk="0" hangingPunct="1">
+              <a:spcBef>
+                <a:spcPct val="20000"/>
+              </a:spcBef>
+              <a:buFont typeface="Wingdings" charset="2"/>
+              <a:buChar char="§"/>
+              <a:tabLst/>
+              <a:defRPr sz="1800" b="0" i="0" kern="1200">
+                <a:solidFill>
+                  <a:schemeClr val="tx1"/>
+                </a:solidFill>
+                <a:latin typeface="Helvetica Neue Light"/>
+                <a:ea typeface="+mn-ea"/>
+                <a:cs typeface="Helvetica Neue Light"/>
+              </a:defRPr>
+            </a:lvl2pPr>
+            <a:lvl3pPr marL="1143000" indent="-228600" algn="l" defTabSz="457200" rtl="0" eaLnBrk="1" latinLnBrk="0" hangingPunct="1">
+              <a:spcBef>
+                <a:spcPct val="20000"/>
+              </a:spcBef>
+              <a:buFont typeface="Arial"/>
+              <a:buChar char="•"/>
+              <a:defRPr sz="2400" b="0" i="0" kern="1200">
+                <a:solidFill>
+                  <a:schemeClr val="tx1"/>
+                </a:solidFill>
+                <a:latin typeface="Helvetica Neue Light"/>
+                <a:ea typeface="+mn-ea"/>
+                <a:cs typeface="Helvetica Neue Light"/>
+              </a:defRPr>
+            </a:lvl3pPr>
+            <a:lvl4pPr marL="1600200" indent="-228600" algn="l" defTabSz="457200" rtl="0" eaLnBrk="1" latinLnBrk="0" hangingPunct="1">
+              <a:spcBef>
+                <a:spcPct val="20000"/>
+              </a:spcBef>
+              <a:buFont typeface="Arial"/>
+              <a:buChar char="–"/>
+              <a:defRPr sz="2000" b="0" i="0" kern="1200">
+                <a:solidFill>
+                  <a:schemeClr val="tx1"/>
+                </a:solidFill>
+                <a:latin typeface="Helvetica Neue Light"/>
+                <a:ea typeface="+mn-ea"/>
+                <a:cs typeface="Helvetica Neue Light"/>
+              </a:defRPr>
+            </a:lvl4pPr>
+            <a:lvl5pPr marL="2057400" indent="-228600" algn="l" defTabSz="457200" rtl="0" eaLnBrk="1" latinLnBrk="0" hangingPunct="1">
+              <a:spcBef>
+                <a:spcPct val="20000"/>
+              </a:spcBef>
+              <a:buFont typeface="Arial"/>
+              <a:buChar char="»"/>
+              <a:defRPr sz="2000" b="0" i="0" kern="1200">
+                <a:solidFill>
+                  <a:schemeClr val="tx1"/>
+                </a:solidFill>
+                <a:latin typeface="Helvetica Neue Light"/>
+                <a:ea typeface="+mn-ea"/>
+                <a:cs typeface="Helvetica Neue Light"/>
+              </a:defRPr>
+            </a:lvl5pPr>
+            <a:lvl6pPr marL="2514600" indent="-228600" algn="l" defTabSz="457200" rtl="0" eaLnBrk="1" latinLnBrk="0" hangingPunct="1">
+              <a:spcBef>
+                <a:spcPct val="20000"/>
+              </a:spcBef>
+              <a:buFont typeface="Arial"/>
+              <a:buChar char="•"/>
+              <a:defRPr sz="2000" kern="1200">
+                <a:solidFill>
+                  <a:schemeClr val="tx1"/>
+                </a:solidFill>
+                <a:latin typeface="+mn-lt"/>
+                <a:ea typeface="+mn-ea"/>
+                <a:cs typeface="+mn-cs"/>
+              </a:defRPr>
+            </a:lvl6pPr>
+            <a:lvl7pPr marL="2971800" indent="-228600" algn="l" defTabSz="457200" rtl="0" eaLnBrk="1" latinLnBrk="0" hangingPunct="1">
+              <a:spcBef>
+                <a:spcPct val="20000"/>
+              </a:spcBef>
+              <a:buFont typeface="Arial"/>
+              <a:buChar char="•"/>
+              <a:defRPr sz="2000" kern="1200">
+                <a:solidFill>
+                  <a:schemeClr val="tx1"/>
+                </a:solidFill>
+                <a:latin typeface="+mn-lt"/>
+                <a:ea typeface="+mn-ea"/>
+                <a:cs typeface="+mn-cs"/>
+              </a:defRPr>
+            </a:lvl7pPr>
+            <a:lvl8pPr marL="3429000" indent="-228600" algn="l" defTabSz="457200" rtl="0" eaLnBrk="1" latinLnBrk="0" hangingPunct="1">
+              <a:spcBef>
+                <a:spcPct val="20000"/>
+              </a:spcBef>
+              <a:buFont typeface="Arial"/>
+              <a:buChar char="•"/>
+              <a:defRPr sz="2000" kern="1200">
+                <a:solidFill>
+                  <a:schemeClr val="tx1"/>
+                </a:solidFill>
+                <a:latin typeface="+mn-lt"/>
+                <a:ea typeface="+mn-ea"/>
+                <a:cs typeface="+mn-cs"/>
+              </a:defRPr>
+            </a:lvl8pPr>
+            <a:lvl9pPr marL="3886200" indent="-228600" algn="l" defTabSz="457200" rtl="0" eaLnBrk="1" latinLnBrk="0" hangingPunct="1">
+              <a:spcBef>
+                <a:spcPct val="20000"/>
+              </a:spcBef>
+              <a:buFont typeface="Arial"/>
+              <a:buChar char="•"/>
+              <a:defRPr sz="2000" kern="1200">
+                <a:solidFill>
+                  <a:schemeClr val="tx1"/>
+                </a:solidFill>
+                <a:latin typeface="+mn-lt"/>
+                <a:ea typeface="+mn-ea"/>
+                <a:cs typeface="+mn-cs"/>
+              </a:defRPr>
+            </a:lvl9pPr>
+          </a:lstStyle>
+          <a:p>
+            <a:pPr>
+              <a:spcBef>
+                <a:spcPts val="0"/>
+              </a:spcBef>
+            </a:pPr>
+            <a:r>
+              <a:rPr lang="de-DE" sz="2600" b="1" dirty="0" err="1">
+                <a:solidFill>
+                  <a:srgbClr val="0391A3"/>
+                </a:solidFill>
+              </a:rPr>
+              <a:t>Generalization</a:t>
+            </a:r>
+            <a:endParaRPr lang="de-DE" sz="2600" b="1" dirty="0">
+              <a:solidFill>
+                <a:srgbClr val="0391A3"/>
+              </a:solidFill>
+            </a:endParaRPr>
+          </a:p>
+          <a:p>
+            <a:pPr>
+              <a:spcBef>
+                <a:spcPts val="0"/>
+              </a:spcBef>
+            </a:pPr>
+            <a:r>
+              <a:rPr lang="en-GB" sz="2600" dirty="0"/>
+              <a:t>higher </a:t>
+            </a:r>
+            <a:r>
+              <a:rPr lang="el-GR" sz="2600" dirty="0"/>
+              <a:t>λ</a:t>
+            </a:r>
+            <a:r>
+              <a:rPr lang="de-DE" sz="2600" dirty="0"/>
+              <a:t> = smoother, </a:t>
+            </a:r>
+            <a:r>
+              <a:rPr lang="de-DE" sz="2600" dirty="0" err="1"/>
+              <a:t>higher</a:t>
+            </a:r>
+            <a:r>
+              <a:rPr lang="de-DE" sz="2600" dirty="0"/>
+              <a:t> </a:t>
+            </a:r>
+            <a:r>
+              <a:rPr lang="de-DE" sz="2600" dirty="0" err="1"/>
+              <a:t>correlation</a:t>
+            </a:r>
+            <a:r>
+              <a:rPr lang="en-GB" sz="2600" dirty="0"/>
+              <a:t> </a:t>
+            </a:r>
+            <a:endParaRPr lang="en-US" sz="2600" dirty="0"/>
+          </a:p>
+        </p:txBody>
+      </p:sp>
+      <p:sp>
+        <p:nvSpPr>
+          <p:cNvPr id="124" name="Content Placeholder 2">
+            <a:extLst>
+              <a:ext uri="{FF2B5EF4-FFF2-40B4-BE49-F238E27FC236}">
+                <a16:creationId xmlns:a16="http://schemas.microsoft.com/office/drawing/2014/main" id="{FCD9708A-783C-7047-5B8C-E30F6D1FA726}"/>
+              </a:ext>
+            </a:extLst>
+          </p:cNvPr>
+          <p:cNvSpPr txBox="1">
+            <a:spLocks/>
+          </p:cNvSpPr>
+          <p:nvPr/>
+        </p:nvSpPr>
+        <p:spPr>
+          <a:xfrm>
+            <a:off x="4991056" y="7456245"/>
+            <a:ext cx="3455332" cy="1125422"/>
+          </a:xfrm>
+          <a:prstGeom prst="rect">
+            <a:avLst/>
+          </a:prstGeom>
+        </p:spPr>
+        <p:txBody>
+          <a:bodyPr vert="horz" lIns="91440" tIns="45720" rIns="91440" bIns="45720" rtlCol="0">
+            <a:noAutofit/>
+          </a:bodyPr>
+          <a:lstStyle>
+            <a:lvl1pPr marL="0" indent="0" algn="l" defTabSz="457200" rtl="0" eaLnBrk="1" latinLnBrk="0" hangingPunct="1">
+              <a:spcBef>
+                <a:spcPct val="20000"/>
+              </a:spcBef>
+              <a:buFont typeface="Wingdings" charset="2"/>
+              <a:buNone/>
+              <a:defRPr sz="2200" b="0" i="0" kern="1200">
+                <a:solidFill>
+                  <a:schemeClr val="tx1"/>
+                </a:solidFill>
+                <a:latin typeface="Helvetica Neue Light"/>
+                <a:ea typeface="+mn-ea"/>
+                <a:cs typeface="Helvetica Neue Light"/>
+              </a:defRPr>
+            </a:lvl1pPr>
+            <a:lvl2pPr marL="715963" indent="-373063" algn="l" defTabSz="457200" rtl="0" eaLnBrk="1" latinLnBrk="0" hangingPunct="1">
+              <a:spcBef>
+                <a:spcPct val="20000"/>
+              </a:spcBef>
+              <a:buFont typeface="Wingdings" charset="2"/>
+              <a:buChar char="§"/>
+              <a:tabLst/>
+              <a:defRPr sz="1800" b="0" i="0" kern="1200">
+                <a:solidFill>
+                  <a:schemeClr val="tx1"/>
+                </a:solidFill>
+                <a:latin typeface="Helvetica Neue Light"/>
+                <a:ea typeface="+mn-ea"/>
+                <a:cs typeface="Helvetica Neue Light"/>
+              </a:defRPr>
+            </a:lvl2pPr>
+            <a:lvl3pPr marL="1143000" indent="-228600" algn="l" defTabSz="457200" rtl="0" eaLnBrk="1" latinLnBrk="0" hangingPunct="1">
+              <a:spcBef>
+                <a:spcPct val="20000"/>
+              </a:spcBef>
+              <a:buFont typeface="Arial"/>
+              <a:buChar char="•"/>
+              <a:defRPr sz="2400" b="0" i="0" kern="1200">
+                <a:solidFill>
+                  <a:schemeClr val="tx1"/>
+                </a:solidFill>
+                <a:latin typeface="Helvetica Neue Light"/>
+                <a:ea typeface="+mn-ea"/>
+                <a:cs typeface="Helvetica Neue Light"/>
+              </a:defRPr>
+            </a:lvl3pPr>
+            <a:lvl4pPr marL="1600200" indent="-228600" algn="l" defTabSz="457200" rtl="0" eaLnBrk="1" latinLnBrk="0" hangingPunct="1">
+              <a:spcBef>
+                <a:spcPct val="20000"/>
+              </a:spcBef>
+              <a:buFont typeface="Arial"/>
+              <a:buChar char="–"/>
+              <a:defRPr sz="2000" b="0" i="0" kern="1200">
+                <a:solidFill>
+                  <a:schemeClr val="tx1"/>
+                </a:solidFill>
+                <a:latin typeface="Helvetica Neue Light"/>
+                <a:ea typeface="+mn-ea"/>
+                <a:cs typeface="Helvetica Neue Light"/>
+              </a:defRPr>
+            </a:lvl4pPr>
+            <a:lvl5pPr marL="2057400" indent="-228600" algn="l" defTabSz="457200" rtl="0" eaLnBrk="1" latinLnBrk="0" hangingPunct="1">
+              <a:spcBef>
+                <a:spcPct val="20000"/>
+              </a:spcBef>
+              <a:buFont typeface="Arial"/>
+              <a:buChar char="»"/>
+              <a:defRPr sz="2000" b="0" i="0" kern="1200">
+                <a:solidFill>
+                  <a:schemeClr val="tx1"/>
+                </a:solidFill>
+                <a:latin typeface="Helvetica Neue Light"/>
+                <a:ea typeface="+mn-ea"/>
+                <a:cs typeface="Helvetica Neue Light"/>
+              </a:defRPr>
+            </a:lvl5pPr>
+            <a:lvl6pPr marL="2514600" indent="-228600" algn="l" defTabSz="457200" rtl="0" eaLnBrk="1" latinLnBrk="0" hangingPunct="1">
+              <a:spcBef>
+                <a:spcPct val="20000"/>
+              </a:spcBef>
+              <a:buFont typeface="Arial"/>
+              <a:buChar char="•"/>
+              <a:defRPr sz="2000" kern="1200">
+                <a:solidFill>
+                  <a:schemeClr val="tx1"/>
+                </a:solidFill>
+                <a:latin typeface="+mn-lt"/>
+                <a:ea typeface="+mn-ea"/>
+                <a:cs typeface="+mn-cs"/>
+              </a:defRPr>
+            </a:lvl6pPr>
+            <a:lvl7pPr marL="2971800" indent="-228600" algn="l" defTabSz="457200" rtl="0" eaLnBrk="1" latinLnBrk="0" hangingPunct="1">
+              <a:spcBef>
+                <a:spcPct val="20000"/>
+              </a:spcBef>
+              <a:buFont typeface="Arial"/>
+              <a:buChar char="•"/>
+              <a:defRPr sz="2000" kern="1200">
+                <a:solidFill>
+                  <a:schemeClr val="tx1"/>
+                </a:solidFill>
+                <a:latin typeface="+mn-lt"/>
+                <a:ea typeface="+mn-ea"/>
+                <a:cs typeface="+mn-cs"/>
+              </a:defRPr>
+            </a:lvl7pPr>
+            <a:lvl8pPr marL="3429000" indent="-228600" algn="l" defTabSz="457200" rtl="0" eaLnBrk="1" latinLnBrk="0" hangingPunct="1">
+              <a:spcBef>
+                <a:spcPct val="20000"/>
+              </a:spcBef>
+              <a:buFont typeface="Arial"/>
+              <a:buChar char="•"/>
+              <a:defRPr sz="2000" kern="1200">
+                <a:solidFill>
+                  <a:schemeClr val="tx1"/>
+                </a:solidFill>
+                <a:latin typeface="+mn-lt"/>
+                <a:ea typeface="+mn-ea"/>
+                <a:cs typeface="+mn-cs"/>
+              </a:defRPr>
+            </a:lvl8pPr>
+            <a:lvl9pPr marL="3886200" indent="-228600" algn="l" defTabSz="457200" rtl="0" eaLnBrk="1" latinLnBrk="0" hangingPunct="1">
+              <a:spcBef>
+                <a:spcPct val="20000"/>
+              </a:spcBef>
+              <a:buFont typeface="Arial"/>
+              <a:buChar char="•"/>
+              <a:defRPr sz="2000" kern="1200">
+                <a:solidFill>
+                  <a:schemeClr val="tx1"/>
+                </a:solidFill>
+                <a:latin typeface="+mn-lt"/>
+                <a:ea typeface="+mn-ea"/>
+                <a:cs typeface="+mn-cs"/>
+              </a:defRPr>
+            </a:lvl9pPr>
+          </a:lstStyle>
+          <a:p>
+            <a:pPr>
+              <a:spcBef>
+                <a:spcPts val="0"/>
+              </a:spcBef>
+            </a:pPr>
+            <a:r>
+              <a:rPr lang="de-DE" sz="2600" b="1" dirty="0">
+                <a:solidFill>
+                  <a:srgbClr val="0391A3"/>
+                </a:solidFill>
+              </a:rPr>
+              <a:t>UCB </a:t>
+            </a:r>
+            <a:r>
+              <a:rPr lang="de-DE" sz="2600" b="1" dirty="0" err="1">
+                <a:solidFill>
+                  <a:srgbClr val="0391A3"/>
+                </a:solidFill>
+              </a:rPr>
+              <a:t>sampling</a:t>
+            </a:r>
+            <a:endParaRPr lang="de-DE" sz="2600" b="1" dirty="0">
+              <a:solidFill>
+                <a:srgbClr val="0391A3"/>
+              </a:solidFill>
+            </a:endParaRPr>
+          </a:p>
+          <a:p>
+            <a:pPr>
+              <a:spcBef>
+                <a:spcPts val="0"/>
+              </a:spcBef>
+            </a:pPr>
+            <a:r>
+              <a:rPr lang="en-GB" sz="2600" dirty="0"/>
+              <a:t>higher </a:t>
+            </a:r>
+            <a:r>
+              <a:rPr lang="el-GR" sz="2600" dirty="0"/>
+              <a:t>β</a:t>
+            </a:r>
+            <a:r>
+              <a:rPr lang="de-DE" sz="2600" dirty="0"/>
+              <a:t> = </a:t>
+            </a:r>
+            <a:r>
+              <a:rPr lang="de-DE" sz="2600" dirty="0" err="1"/>
+              <a:t>more</a:t>
+            </a:r>
+            <a:r>
+              <a:rPr lang="de-DE" sz="2600" dirty="0"/>
+              <a:t> </a:t>
+            </a:r>
+            <a:r>
+              <a:rPr lang="de-DE" sz="2600" dirty="0" err="1"/>
+              <a:t>directed</a:t>
+            </a:r>
+            <a:r>
+              <a:rPr lang="de-DE" sz="2600" dirty="0"/>
+              <a:t> </a:t>
+            </a:r>
+            <a:r>
+              <a:rPr lang="de-DE" sz="2600" dirty="0" err="1"/>
+              <a:t>exploration</a:t>
+            </a:r>
+            <a:r>
+              <a:rPr lang="en-GB" sz="2600" dirty="0"/>
+              <a:t> </a:t>
+            </a:r>
+            <a:endParaRPr lang="en-US" sz="2600" dirty="0"/>
+          </a:p>
+        </p:txBody>
+      </p:sp>
+      <p:sp>
+        <p:nvSpPr>
+          <p:cNvPr id="125" name="Content Placeholder 2">
+            <a:extLst>
+              <a:ext uri="{FF2B5EF4-FFF2-40B4-BE49-F238E27FC236}">
+                <a16:creationId xmlns:a16="http://schemas.microsoft.com/office/drawing/2014/main" id="{0D4F596C-D575-D0CF-4F28-49310B854EF8}"/>
+              </a:ext>
+            </a:extLst>
+          </p:cNvPr>
+          <p:cNvSpPr txBox="1">
+            <a:spLocks/>
+          </p:cNvSpPr>
+          <p:nvPr/>
+        </p:nvSpPr>
+        <p:spPr>
+          <a:xfrm>
+            <a:off x="9588298" y="6875671"/>
+            <a:ext cx="4028490" cy="1125422"/>
+          </a:xfrm>
+          <a:prstGeom prst="rect">
+            <a:avLst/>
+          </a:prstGeom>
+        </p:spPr>
+        <p:txBody>
+          <a:bodyPr vert="horz" lIns="91440" tIns="45720" rIns="91440" bIns="45720" rtlCol="0">
+            <a:noAutofit/>
+          </a:bodyPr>
+          <a:lstStyle>
+            <a:lvl1pPr marL="0" indent="0" algn="l" defTabSz="457200" rtl="0" eaLnBrk="1" latinLnBrk="0" hangingPunct="1">
+              <a:spcBef>
+                <a:spcPct val="20000"/>
+              </a:spcBef>
+              <a:buFont typeface="Wingdings" charset="2"/>
+              <a:buNone/>
+              <a:defRPr sz="2200" b="0" i="0" kern="1200">
+                <a:solidFill>
+                  <a:schemeClr val="tx1"/>
+                </a:solidFill>
+                <a:latin typeface="Helvetica Neue Light"/>
+                <a:ea typeface="+mn-ea"/>
+                <a:cs typeface="Helvetica Neue Light"/>
+              </a:defRPr>
+            </a:lvl1pPr>
+            <a:lvl2pPr marL="715963" indent="-373063" algn="l" defTabSz="457200" rtl="0" eaLnBrk="1" latinLnBrk="0" hangingPunct="1">
+              <a:spcBef>
+                <a:spcPct val="20000"/>
+              </a:spcBef>
+              <a:buFont typeface="Wingdings" charset="2"/>
+              <a:buChar char="§"/>
+              <a:tabLst/>
+              <a:defRPr sz="1800" b="0" i="0" kern="1200">
+                <a:solidFill>
+                  <a:schemeClr val="tx1"/>
+                </a:solidFill>
+                <a:latin typeface="Helvetica Neue Light"/>
+                <a:ea typeface="+mn-ea"/>
+                <a:cs typeface="Helvetica Neue Light"/>
+              </a:defRPr>
+            </a:lvl2pPr>
+            <a:lvl3pPr marL="1143000" indent="-228600" algn="l" defTabSz="457200" rtl="0" eaLnBrk="1" latinLnBrk="0" hangingPunct="1">
+              <a:spcBef>
+                <a:spcPct val="20000"/>
+              </a:spcBef>
+              <a:buFont typeface="Arial"/>
+              <a:buChar char="•"/>
+              <a:defRPr sz="2400" b="0" i="0" kern="1200">
+                <a:solidFill>
+                  <a:schemeClr val="tx1"/>
+                </a:solidFill>
+                <a:latin typeface="Helvetica Neue Light"/>
+                <a:ea typeface="+mn-ea"/>
+                <a:cs typeface="Helvetica Neue Light"/>
+              </a:defRPr>
+            </a:lvl3pPr>
+            <a:lvl4pPr marL="1600200" indent="-228600" algn="l" defTabSz="457200" rtl="0" eaLnBrk="1" latinLnBrk="0" hangingPunct="1">
+              <a:spcBef>
+                <a:spcPct val="20000"/>
+              </a:spcBef>
+              <a:buFont typeface="Arial"/>
+              <a:buChar char="–"/>
+              <a:defRPr sz="2000" b="0" i="0" kern="1200">
+                <a:solidFill>
+                  <a:schemeClr val="tx1"/>
+                </a:solidFill>
+                <a:latin typeface="Helvetica Neue Light"/>
+                <a:ea typeface="+mn-ea"/>
+                <a:cs typeface="Helvetica Neue Light"/>
+              </a:defRPr>
+            </a:lvl4pPr>
+            <a:lvl5pPr marL="2057400" indent="-228600" algn="l" defTabSz="457200" rtl="0" eaLnBrk="1" latinLnBrk="0" hangingPunct="1">
+              <a:spcBef>
+                <a:spcPct val="20000"/>
+              </a:spcBef>
+              <a:buFont typeface="Arial"/>
+              <a:buChar char="»"/>
+              <a:defRPr sz="2000" b="0" i="0" kern="1200">
+                <a:solidFill>
+                  <a:schemeClr val="tx1"/>
+                </a:solidFill>
+                <a:latin typeface="Helvetica Neue Light"/>
+                <a:ea typeface="+mn-ea"/>
+                <a:cs typeface="Helvetica Neue Light"/>
+              </a:defRPr>
+            </a:lvl5pPr>
+            <a:lvl6pPr marL="2514600" indent="-228600" algn="l" defTabSz="457200" rtl="0" eaLnBrk="1" latinLnBrk="0" hangingPunct="1">
+              <a:spcBef>
+                <a:spcPct val="20000"/>
+              </a:spcBef>
+              <a:buFont typeface="Arial"/>
+              <a:buChar char="•"/>
+              <a:defRPr sz="2000" kern="1200">
+                <a:solidFill>
+                  <a:schemeClr val="tx1"/>
+                </a:solidFill>
+                <a:latin typeface="+mn-lt"/>
+                <a:ea typeface="+mn-ea"/>
+                <a:cs typeface="+mn-cs"/>
+              </a:defRPr>
+            </a:lvl6pPr>
+            <a:lvl7pPr marL="2971800" indent="-228600" algn="l" defTabSz="457200" rtl="0" eaLnBrk="1" latinLnBrk="0" hangingPunct="1">
+              <a:spcBef>
+                <a:spcPct val="20000"/>
+              </a:spcBef>
+              <a:buFont typeface="Arial"/>
+              <a:buChar char="•"/>
+              <a:defRPr sz="2000" kern="1200">
+                <a:solidFill>
+                  <a:schemeClr val="tx1"/>
+                </a:solidFill>
+                <a:latin typeface="+mn-lt"/>
+                <a:ea typeface="+mn-ea"/>
+                <a:cs typeface="+mn-cs"/>
+              </a:defRPr>
+            </a:lvl7pPr>
+            <a:lvl8pPr marL="3429000" indent="-228600" algn="l" defTabSz="457200" rtl="0" eaLnBrk="1" latinLnBrk="0" hangingPunct="1">
+              <a:spcBef>
+                <a:spcPct val="20000"/>
+              </a:spcBef>
+              <a:buFont typeface="Arial"/>
+              <a:buChar char="•"/>
+              <a:defRPr sz="2000" kern="1200">
+                <a:solidFill>
+                  <a:schemeClr val="tx1"/>
+                </a:solidFill>
+                <a:latin typeface="+mn-lt"/>
+                <a:ea typeface="+mn-ea"/>
+                <a:cs typeface="+mn-cs"/>
+              </a:defRPr>
+            </a:lvl8pPr>
+            <a:lvl9pPr marL="3886200" indent="-228600" algn="l" defTabSz="457200" rtl="0" eaLnBrk="1" latinLnBrk="0" hangingPunct="1">
+              <a:spcBef>
+                <a:spcPct val="20000"/>
+              </a:spcBef>
+              <a:buFont typeface="Arial"/>
+              <a:buChar char="•"/>
+              <a:defRPr sz="2000" kern="1200">
+                <a:solidFill>
+                  <a:schemeClr val="tx1"/>
+                </a:solidFill>
+                <a:latin typeface="+mn-lt"/>
+                <a:ea typeface="+mn-ea"/>
+                <a:cs typeface="+mn-cs"/>
+              </a:defRPr>
+            </a:lvl9pPr>
+          </a:lstStyle>
+          <a:p>
+            <a:pPr>
+              <a:spcBef>
+                <a:spcPts val="0"/>
+              </a:spcBef>
+            </a:pPr>
+            <a:r>
+              <a:rPr lang="de-DE" sz="2600" b="1" dirty="0" err="1">
+                <a:solidFill>
+                  <a:srgbClr val="0391A3"/>
+                </a:solidFill>
+              </a:rPr>
+              <a:t>Softmax</a:t>
+            </a:r>
+            <a:r>
+              <a:rPr lang="de-DE" sz="2600" b="1" dirty="0">
+                <a:solidFill>
+                  <a:srgbClr val="0391A3"/>
+                </a:solidFill>
+              </a:rPr>
+              <a:t> </a:t>
+            </a:r>
+            <a:r>
+              <a:rPr lang="de-DE" sz="2600" b="1" dirty="0" err="1">
+                <a:solidFill>
+                  <a:srgbClr val="0391A3"/>
+                </a:solidFill>
+              </a:rPr>
+              <a:t>choice</a:t>
+            </a:r>
+            <a:r>
+              <a:rPr lang="de-DE" sz="2600" b="1" dirty="0">
+                <a:solidFill>
+                  <a:srgbClr val="0391A3"/>
+                </a:solidFill>
+              </a:rPr>
+              <a:t> </a:t>
+            </a:r>
+            <a:r>
+              <a:rPr lang="de-DE" sz="2600" b="1" dirty="0" err="1">
+                <a:solidFill>
+                  <a:srgbClr val="0391A3"/>
+                </a:solidFill>
+              </a:rPr>
+              <a:t>rule</a:t>
+            </a:r>
+            <a:endParaRPr lang="de-DE" sz="2600" b="1" dirty="0">
+              <a:solidFill>
+                <a:srgbClr val="0391A3"/>
+              </a:solidFill>
+            </a:endParaRPr>
+          </a:p>
+          <a:p>
+            <a:pPr>
+              <a:spcBef>
+                <a:spcPts val="0"/>
+              </a:spcBef>
+            </a:pPr>
+            <a:r>
+              <a:rPr lang="de-DE" sz="2600" dirty="0" err="1"/>
+              <a:t>higher</a:t>
+            </a:r>
+            <a:r>
+              <a:rPr lang="de-DE" sz="2600" dirty="0"/>
+              <a:t> </a:t>
+            </a:r>
+            <a:r>
+              <a:rPr lang="el-GR" sz="2600" dirty="0"/>
+              <a:t>τ</a:t>
+            </a:r>
+            <a:r>
+              <a:rPr lang="de-DE" sz="2600" dirty="0"/>
+              <a:t> = </a:t>
+            </a:r>
+            <a:r>
+              <a:rPr lang="de-DE" sz="2600" dirty="0" err="1"/>
+              <a:t>more</a:t>
+            </a:r>
+            <a:r>
+              <a:rPr lang="de-DE" sz="2600" dirty="0"/>
+              <a:t> </a:t>
+            </a:r>
+            <a:r>
+              <a:rPr lang="de-DE" sz="2600" dirty="0" err="1"/>
+              <a:t>random</a:t>
+            </a:r>
+            <a:r>
+              <a:rPr lang="de-DE" sz="2600" dirty="0"/>
+              <a:t> </a:t>
+            </a:r>
+            <a:r>
+              <a:rPr lang="de-DE" sz="2600" dirty="0" err="1"/>
+              <a:t>exploration</a:t>
+            </a:r>
+            <a:r>
+              <a:rPr lang="en-GB" sz="2600" dirty="0"/>
+              <a:t> </a:t>
+            </a:r>
+            <a:endParaRPr lang="en-US" sz="2600" dirty="0"/>
+          </a:p>
+        </p:txBody>
+      </p:sp>
+      <p:sp>
+        <p:nvSpPr>
+          <p:cNvPr id="128" name="TextBox 127">
+            <a:extLst>
+              <a:ext uri="{FF2B5EF4-FFF2-40B4-BE49-F238E27FC236}">
+                <a16:creationId xmlns:a16="http://schemas.microsoft.com/office/drawing/2014/main" id="{4BFB5192-6DDE-2644-EB60-3F8655EC779D}"/>
+              </a:ext>
+            </a:extLst>
+          </p:cNvPr>
+          <p:cNvSpPr txBox="1"/>
+          <p:nvPr/>
+        </p:nvSpPr>
+        <p:spPr>
+          <a:xfrm>
+            <a:off x="163466" y="109156"/>
+            <a:ext cx="1864613" cy="324000"/>
+          </a:xfrm>
+          <a:prstGeom prst="rect">
+            <a:avLst/>
+          </a:prstGeom>
+          <a:solidFill>
+            <a:schemeClr val="bg1"/>
+          </a:solidFill>
+        </p:spPr>
+        <p:txBody>
+          <a:bodyPr wrap="none" rtlCol="0">
+            <a:spAutoFit/>
+          </a:bodyPr>
+          <a:lstStyle/>
+          <a:p>
+            <a:r>
+              <a:rPr lang="en-US" sz="1600" dirty="0">
+                <a:latin typeface="Helvetica Neue" panose="02000503000000020004" pitchFamily="2" charset="0"/>
+                <a:ea typeface="Helvetica Neue" panose="02000503000000020004" pitchFamily="2" charset="0"/>
+                <a:cs typeface="Helvetica Neue" panose="02000503000000020004" pitchFamily="2" charset="0"/>
+              </a:rPr>
+              <a:t>Observations (t=8)</a:t>
+            </a:r>
+          </a:p>
+        </p:txBody>
+      </p:sp>
+      <p:sp>
+        <p:nvSpPr>
+          <p:cNvPr id="129" name="TextBox 128">
+            <a:extLst>
+              <a:ext uri="{FF2B5EF4-FFF2-40B4-BE49-F238E27FC236}">
+                <a16:creationId xmlns:a16="http://schemas.microsoft.com/office/drawing/2014/main" id="{47A3F61F-CC7F-4842-5562-D96851CD91A3}"/>
+              </a:ext>
+            </a:extLst>
+          </p:cNvPr>
+          <p:cNvSpPr txBox="1"/>
+          <p:nvPr/>
+        </p:nvSpPr>
+        <p:spPr>
+          <a:xfrm>
+            <a:off x="8948062" y="109156"/>
+            <a:ext cx="3129383" cy="324000"/>
+          </a:xfrm>
+          <a:prstGeom prst="rect">
+            <a:avLst/>
+          </a:prstGeom>
+          <a:solidFill>
+            <a:schemeClr val="bg1"/>
+          </a:solidFill>
+        </p:spPr>
+        <p:txBody>
+          <a:bodyPr wrap="none" rtlCol="0">
+            <a:spAutoFit/>
+          </a:bodyPr>
+          <a:lstStyle/>
+          <a:p>
+            <a:r>
+              <a:rPr lang="en-US" sz="1600" dirty="0">
+                <a:latin typeface="Helvetica Neue" panose="02000503000000020004" pitchFamily="2" charset="0"/>
+                <a:ea typeface="Helvetica Neue" panose="02000503000000020004" pitchFamily="2" charset="0"/>
+                <a:cs typeface="Helvetica Neue" panose="02000503000000020004" pitchFamily="2" charset="0"/>
+              </a:rPr>
+              <a:t>Upper Confidence Bound (UCB)</a:t>
+            </a:r>
+          </a:p>
+        </p:txBody>
+      </p:sp>
+      <p:sp>
+        <p:nvSpPr>
+          <p:cNvPr id="130" name="TextBox 129">
+            <a:extLst>
+              <a:ext uri="{FF2B5EF4-FFF2-40B4-BE49-F238E27FC236}">
+                <a16:creationId xmlns:a16="http://schemas.microsoft.com/office/drawing/2014/main" id="{30F20D44-CAC9-5025-98A3-1DFC0D55FA7A}"/>
+              </a:ext>
+            </a:extLst>
+          </p:cNvPr>
+          <p:cNvSpPr txBox="1"/>
+          <p:nvPr/>
+        </p:nvSpPr>
+        <p:spPr>
+          <a:xfrm>
+            <a:off x="2681402" y="109156"/>
+            <a:ext cx="1844351" cy="324000"/>
+          </a:xfrm>
+          <a:prstGeom prst="rect">
+            <a:avLst/>
+          </a:prstGeom>
+          <a:solidFill>
+            <a:schemeClr val="bg1"/>
+          </a:solidFill>
+        </p:spPr>
+        <p:txBody>
+          <a:bodyPr wrap="none" rtlCol="0">
+            <a:spAutoFit/>
+          </a:bodyPr>
+          <a:lstStyle/>
+          <a:p>
+            <a:r>
+              <a:rPr lang="en-US" sz="1600" dirty="0">
+                <a:latin typeface="Helvetica Neue" panose="02000503000000020004" pitchFamily="2" charset="0"/>
+                <a:ea typeface="Helvetica Neue" panose="02000503000000020004" pitchFamily="2" charset="0"/>
+                <a:cs typeface="Helvetica Neue" panose="02000503000000020004" pitchFamily="2" charset="0"/>
+              </a:rPr>
+              <a:t>Expected rewards</a:t>
+            </a:r>
+          </a:p>
+        </p:txBody>
+      </p:sp>
+      <p:sp>
+        <p:nvSpPr>
+          <p:cNvPr id="131" name="TextBox 130">
+            <a:extLst>
+              <a:ext uri="{FF2B5EF4-FFF2-40B4-BE49-F238E27FC236}">
+                <a16:creationId xmlns:a16="http://schemas.microsoft.com/office/drawing/2014/main" id="{8A29EEA5-98EC-C524-B8BB-20B5181B7628}"/>
+              </a:ext>
+            </a:extLst>
+          </p:cNvPr>
+          <p:cNvSpPr txBox="1"/>
+          <p:nvPr/>
+        </p:nvSpPr>
+        <p:spPr>
+          <a:xfrm>
+            <a:off x="5821377" y="109156"/>
+            <a:ext cx="1236236" cy="324000"/>
+          </a:xfrm>
+          <a:prstGeom prst="rect">
+            <a:avLst/>
+          </a:prstGeom>
+          <a:solidFill>
+            <a:schemeClr val="bg1"/>
+          </a:solidFill>
+        </p:spPr>
+        <p:txBody>
+          <a:bodyPr wrap="none" rtlCol="0">
+            <a:spAutoFit/>
+          </a:bodyPr>
+          <a:lstStyle/>
+          <a:p>
+            <a:r>
+              <a:rPr lang="en-US" sz="1600" dirty="0">
+                <a:latin typeface="Helvetica Neue" panose="02000503000000020004" pitchFamily="2" charset="0"/>
+                <a:ea typeface="Helvetica Neue" panose="02000503000000020004" pitchFamily="2" charset="0"/>
+                <a:cs typeface="Helvetica Neue" panose="02000503000000020004" pitchFamily="2" charset="0"/>
+              </a:rPr>
+              <a:t>Uncertainty</a:t>
+            </a:r>
+          </a:p>
+        </p:txBody>
+      </p:sp>
+      <p:sp>
+        <p:nvSpPr>
+          <p:cNvPr id="132" name="TextBox 131">
+            <a:extLst>
+              <a:ext uri="{FF2B5EF4-FFF2-40B4-BE49-F238E27FC236}">
+                <a16:creationId xmlns:a16="http://schemas.microsoft.com/office/drawing/2014/main" id="{836EC54B-FF28-75A0-A22C-6DC0080B463B}"/>
+              </a:ext>
+            </a:extLst>
+          </p:cNvPr>
+          <p:cNvSpPr txBox="1"/>
+          <p:nvPr/>
+        </p:nvSpPr>
+        <p:spPr>
+          <a:xfrm>
+            <a:off x="12115676" y="109156"/>
+            <a:ext cx="2026004" cy="324000"/>
+          </a:xfrm>
+          <a:prstGeom prst="rect">
+            <a:avLst/>
+          </a:prstGeom>
+          <a:solidFill>
+            <a:schemeClr val="bg1"/>
+          </a:solidFill>
+        </p:spPr>
+        <p:txBody>
+          <a:bodyPr wrap="none" rtlCol="0">
+            <a:spAutoFit/>
+          </a:bodyPr>
+          <a:lstStyle/>
+          <a:p>
+            <a:r>
+              <a:rPr lang="en-US" sz="1600" dirty="0" err="1">
+                <a:latin typeface="Helvetica Neue" panose="02000503000000020004" pitchFamily="2" charset="0"/>
+                <a:ea typeface="Helvetica Neue" panose="02000503000000020004" pitchFamily="2" charset="0"/>
+                <a:cs typeface="Helvetica Neue" panose="02000503000000020004" pitchFamily="2" charset="0"/>
+              </a:rPr>
+              <a:t>Softmax</a:t>
+            </a:r>
+            <a:r>
+              <a:rPr lang="en-US" sz="1600" dirty="0">
+                <a:latin typeface="Helvetica Neue" panose="02000503000000020004" pitchFamily="2" charset="0"/>
+                <a:ea typeface="Helvetica Neue" panose="02000503000000020004" pitchFamily="2" charset="0"/>
+                <a:cs typeface="Helvetica Neue" panose="02000503000000020004" pitchFamily="2" charset="0"/>
+              </a:rPr>
+              <a:t> predictions</a:t>
+            </a:r>
+          </a:p>
+        </p:txBody>
+      </p:sp>
+      <p:sp>
+        <p:nvSpPr>
+          <p:cNvPr id="133" name="TextBox 132">
+            <a:extLst>
+              <a:ext uri="{FF2B5EF4-FFF2-40B4-BE49-F238E27FC236}">
+                <a16:creationId xmlns:a16="http://schemas.microsoft.com/office/drawing/2014/main" id="{BF60EC18-EBEC-BE0E-F3E0-CE017D1D1F65}"/>
+              </a:ext>
+            </a:extLst>
+          </p:cNvPr>
+          <p:cNvSpPr txBox="1"/>
+          <p:nvPr/>
+        </p:nvSpPr>
+        <p:spPr>
+          <a:xfrm>
+            <a:off x="4597003" y="2811354"/>
+            <a:ext cx="1649811" cy="288000"/>
+          </a:xfrm>
+          <a:prstGeom prst="rect">
+            <a:avLst/>
+          </a:prstGeom>
+          <a:solidFill>
+            <a:schemeClr val="bg1"/>
+          </a:solidFill>
+        </p:spPr>
+        <p:txBody>
+          <a:bodyPr wrap="none" rtlCol="0">
+            <a:spAutoFit/>
+          </a:bodyPr>
+          <a:lstStyle/>
+          <a:p>
+            <a:r>
+              <a:rPr lang="en-US" sz="1600" dirty="0">
+                <a:latin typeface="Helvetica Neue" panose="02000503000000020004" pitchFamily="2" charset="0"/>
+                <a:ea typeface="Helvetica Neue" panose="02000503000000020004" pitchFamily="2" charset="0"/>
+                <a:cs typeface="Helvetica Neue" panose="02000503000000020004" pitchFamily="2" charset="0"/>
+              </a:rPr>
+              <a:t>Generalization </a:t>
+            </a:r>
+            <a:r>
+              <a:rPr lang="el-GR" sz="1600" dirty="0">
+                <a:latin typeface="Cambria Math" panose="02040503050406030204" pitchFamily="18" charset="0"/>
+                <a:ea typeface="Cambria Math" panose="02040503050406030204" pitchFamily="18" charset="0"/>
+                <a:cs typeface="Helvetica Neue" panose="02000503000000020004" pitchFamily="2" charset="0"/>
+              </a:rPr>
+              <a:t>λ</a:t>
+            </a:r>
+            <a:endParaRPr lang="en-US" sz="1600" dirty="0">
+              <a:latin typeface="Cambria Math" panose="02040503050406030204" pitchFamily="18" charset="0"/>
+              <a:ea typeface="Cambria Math" panose="02040503050406030204" pitchFamily="18" charset="0"/>
+              <a:cs typeface="Helvetica Neue" panose="02000503000000020004" pitchFamily="2" charset="0"/>
+            </a:endParaRPr>
+          </a:p>
+        </p:txBody>
+      </p:sp>
+      <p:sp>
+        <p:nvSpPr>
+          <p:cNvPr id="134" name="TextBox 133">
+            <a:extLst>
+              <a:ext uri="{FF2B5EF4-FFF2-40B4-BE49-F238E27FC236}">
+                <a16:creationId xmlns:a16="http://schemas.microsoft.com/office/drawing/2014/main" id="{BF7199D9-930E-BB5A-1D09-AD0E060B8C30}"/>
+              </a:ext>
+            </a:extLst>
+          </p:cNvPr>
+          <p:cNvSpPr txBox="1"/>
+          <p:nvPr/>
+        </p:nvSpPr>
+        <p:spPr>
+          <a:xfrm>
+            <a:off x="7653804" y="2811354"/>
+            <a:ext cx="2016899" cy="288000"/>
+          </a:xfrm>
+          <a:prstGeom prst="rect">
+            <a:avLst/>
+          </a:prstGeom>
+          <a:solidFill>
+            <a:schemeClr val="bg1"/>
+          </a:solidFill>
+        </p:spPr>
+        <p:txBody>
+          <a:bodyPr wrap="none" rtlCol="0">
+            <a:spAutoFit/>
+          </a:bodyPr>
+          <a:lstStyle/>
+          <a:p>
+            <a:r>
+              <a:rPr lang="en-US" sz="1600" dirty="0">
+                <a:latin typeface="Helvetica Neue" panose="02000503000000020004" pitchFamily="2" charset="0"/>
+                <a:ea typeface="Helvetica Neue" panose="02000503000000020004" pitchFamily="2" charset="0"/>
+                <a:cs typeface="Helvetica Neue" panose="02000503000000020004" pitchFamily="2" charset="0"/>
+              </a:rPr>
+              <a:t>Exploration bonus </a:t>
+            </a:r>
+            <a:r>
+              <a:rPr lang="el-GR" sz="1600" dirty="0">
+                <a:latin typeface="Cambria Math" panose="02040503050406030204" pitchFamily="18" charset="0"/>
+                <a:ea typeface="Cambria Math" panose="02040503050406030204" pitchFamily="18" charset="0"/>
+                <a:cs typeface="Helvetica Neue" panose="02000503000000020004" pitchFamily="2" charset="0"/>
+              </a:rPr>
+              <a:t>β</a:t>
+            </a:r>
+            <a:endParaRPr lang="en-US" sz="1600" dirty="0">
+              <a:latin typeface="Cambria Math" panose="02040503050406030204" pitchFamily="18" charset="0"/>
+              <a:ea typeface="Cambria Math" panose="02040503050406030204" pitchFamily="18" charset="0"/>
+              <a:cs typeface="Helvetica Neue" panose="02000503000000020004" pitchFamily="2" charset="0"/>
+            </a:endParaRPr>
+          </a:p>
+        </p:txBody>
+      </p:sp>
+      <p:sp>
+        <p:nvSpPr>
+          <p:cNvPr id="135" name="TextBox 134">
+            <a:extLst>
+              <a:ext uri="{FF2B5EF4-FFF2-40B4-BE49-F238E27FC236}">
+                <a16:creationId xmlns:a16="http://schemas.microsoft.com/office/drawing/2014/main" id="{0F92ACD2-B849-CC7C-3AB6-23ADA5C8FCCC}"/>
+              </a:ext>
+            </a:extLst>
+          </p:cNvPr>
+          <p:cNvSpPr txBox="1"/>
+          <p:nvPr/>
+        </p:nvSpPr>
+        <p:spPr>
+          <a:xfrm>
+            <a:off x="10648791" y="2811354"/>
+            <a:ext cx="2292102" cy="288000"/>
+          </a:xfrm>
+          <a:prstGeom prst="rect">
+            <a:avLst/>
+          </a:prstGeom>
+          <a:solidFill>
+            <a:schemeClr val="bg1"/>
+          </a:solidFill>
+        </p:spPr>
+        <p:txBody>
+          <a:bodyPr wrap="none" rtlCol="0">
+            <a:spAutoFit/>
+          </a:bodyPr>
+          <a:lstStyle/>
+          <a:p>
+            <a:r>
+              <a:rPr lang="en-US" sz="1600" dirty="0">
+                <a:latin typeface="Helvetica Neue" panose="02000503000000020004" pitchFamily="2" charset="0"/>
+                <a:ea typeface="Helvetica Neue" panose="02000503000000020004" pitchFamily="2" charset="0"/>
+                <a:cs typeface="Helvetica Neue" panose="02000503000000020004" pitchFamily="2" charset="0"/>
+              </a:rPr>
+              <a:t>Random temperature </a:t>
+            </a:r>
+            <a:r>
+              <a:rPr lang="el-GR" sz="1600" dirty="0">
+                <a:latin typeface="Cambria Math" panose="02040503050406030204" pitchFamily="18" charset="0"/>
+                <a:ea typeface="Cambria Math" panose="02040503050406030204" pitchFamily="18" charset="0"/>
+                <a:cs typeface="Helvetica Neue" panose="02000503000000020004" pitchFamily="2" charset="0"/>
+              </a:rPr>
+              <a:t>τ</a:t>
+            </a:r>
+            <a:endParaRPr lang="en-US" sz="1600" dirty="0">
+              <a:latin typeface="Cambria Math" panose="02040503050406030204" pitchFamily="18" charset="0"/>
+              <a:ea typeface="Cambria Math" panose="02040503050406030204" pitchFamily="18" charset="0"/>
+              <a:cs typeface="Helvetica Neue" panose="02000503000000020004" pitchFamily="2" charset="0"/>
+            </a:endParaRPr>
+          </a:p>
+        </p:txBody>
+      </p:sp>
+      <mc:AlternateContent xmlns:mc="http://schemas.openxmlformats.org/markup-compatibility/2006" xmlns:a14="http://schemas.microsoft.com/office/drawing/2010/main">
+        <mc:Choice Requires="a14">
+          <p:sp>
+            <p:nvSpPr>
+              <p:cNvPr id="3" name="TextBox 2">
+                <a:extLst>
+                  <a:ext uri="{FF2B5EF4-FFF2-40B4-BE49-F238E27FC236}">
+                    <a16:creationId xmlns:a16="http://schemas.microsoft.com/office/drawing/2014/main" id="{9DF09782-66BA-6EC5-FD66-8CCC79071751}"/>
+                  </a:ext>
+                </a:extLst>
+              </p:cNvPr>
+              <p:cNvSpPr txBox="1"/>
+              <p:nvPr/>
+            </p:nvSpPr>
+            <p:spPr>
+              <a:xfrm>
+                <a:off x="5115709" y="686620"/>
+                <a:ext cx="756000" cy="288000"/>
+              </a:xfrm>
+              <a:prstGeom prst="rect">
+                <a:avLst/>
+              </a:prstGeom>
+              <a:solidFill>
+                <a:schemeClr val="bg1"/>
+              </a:solidFill>
+            </p:spPr>
+            <p:txBody>
+              <a:bodyPr wrap="none" rtlCol="0">
+                <a:spAutoFit/>
+              </a:bodyPr>
+              <a:lstStyle/>
+              <a:p>
+                <a:pPr/>
+                <a14:m>
+                  <m:oMathPara xmlns:m="http://schemas.openxmlformats.org/officeDocument/2006/math">
+                    <m:oMathParaPr>
+                      <m:jc m:val="centerGroup"/>
+                    </m:oMathParaPr>
+                    <m:oMath xmlns:m="http://schemas.openxmlformats.org/officeDocument/2006/math">
+                      <m:r>
+                        <a:rPr lang="de-DE" sz="1400" b="0" i="1" smtClean="0">
+                          <a:latin typeface="Cambria Math" panose="02040503050406030204" pitchFamily="18" charset="0"/>
+                          <a:ea typeface="Cambria Math" panose="02040503050406030204" pitchFamily="18" charset="0"/>
+                        </a:rPr>
+                        <m:t>𝑚</m:t>
+                      </m:r>
+                      <m:r>
+                        <a:rPr lang="de-DE" sz="1400" b="0" i="1" smtClean="0">
+                          <a:latin typeface="Cambria Math" panose="02040503050406030204" pitchFamily="18" charset="0"/>
+                          <a:ea typeface="Cambria Math" panose="02040503050406030204" pitchFamily="18" charset="0"/>
+                        </a:rPr>
+                        <m:t>(</m:t>
+                      </m:r>
+                      <m:r>
+                        <a:rPr lang="de-DE" sz="1400" b="1" i="1" smtClean="0">
+                          <a:latin typeface="Cambria Math" panose="02040503050406030204" pitchFamily="18" charset="0"/>
+                          <a:ea typeface="Cambria Math" panose="02040503050406030204" pitchFamily="18" charset="0"/>
+                        </a:rPr>
+                        <m:t>𝒙</m:t>
+                      </m:r>
+                      <m:r>
+                        <a:rPr lang="de-DE" sz="1400" b="0" i="1" smtClean="0">
+                          <a:latin typeface="Cambria Math" panose="02040503050406030204" pitchFamily="18" charset="0"/>
+                          <a:ea typeface="Cambria Math" panose="02040503050406030204" pitchFamily="18" charset="0"/>
+                        </a:rPr>
+                        <m:t>|</m:t>
+                      </m:r>
+                      <m:r>
+                        <a:rPr lang="de-DE" sz="1400" b="0" i="1" smtClean="0">
+                          <a:latin typeface="Cambria Math" panose="02040503050406030204" pitchFamily="18" charset="0"/>
+                          <a:ea typeface="Cambria Math" panose="02040503050406030204" pitchFamily="18" charset="0"/>
+                        </a:rPr>
+                        <m:t>𝐷</m:t>
+                      </m:r>
+                      <m:r>
+                        <a:rPr lang="de-DE" sz="1400" b="0" i="1" smtClean="0">
+                          <a:latin typeface="Cambria Math" panose="02040503050406030204" pitchFamily="18" charset="0"/>
+                          <a:ea typeface="Cambria Math" panose="02040503050406030204" pitchFamily="18" charset="0"/>
+                        </a:rPr>
+                        <m:t>)</m:t>
+                      </m:r>
+                    </m:oMath>
+                  </m:oMathPara>
+                </a14:m>
+                <a:endParaRPr lang="en-US" sz="1400" dirty="0">
+                  <a:latin typeface="Cambria Math" panose="02040503050406030204" pitchFamily="18" charset="0"/>
+                  <a:ea typeface="Cambria Math" panose="02040503050406030204" pitchFamily="18" charset="0"/>
+                </a:endParaRPr>
+              </a:p>
+            </p:txBody>
+          </p:sp>
+        </mc:Choice>
+        <mc:Fallback xmlns="">
+          <p:sp>
+            <p:nvSpPr>
+              <p:cNvPr id="3" name="TextBox 2">
+                <a:extLst>
+                  <a:ext uri="{FF2B5EF4-FFF2-40B4-BE49-F238E27FC236}">
+                    <a16:creationId xmlns:a16="http://schemas.microsoft.com/office/drawing/2014/main" id="{9DF09782-66BA-6EC5-FD66-8CCC79071751}"/>
+                  </a:ext>
+                </a:extLst>
+              </p:cNvPr>
+              <p:cNvSpPr txBox="1">
+                <a:spLocks noRot="1" noChangeAspect="1" noMove="1" noResize="1" noEditPoints="1" noAdjustHandles="1" noChangeArrowheads="1" noChangeShapeType="1" noTextEdit="1"/>
+              </p:cNvSpPr>
+              <p:nvPr/>
+            </p:nvSpPr>
+            <p:spPr>
+              <a:xfrm>
+                <a:off x="5115709" y="686620"/>
+                <a:ext cx="756000" cy="288000"/>
+              </a:xfrm>
+              <a:prstGeom prst="rect">
+                <a:avLst/>
+              </a:prstGeom>
+              <a:blipFill>
+                <a:blip r:embed="rId7"/>
+                <a:stretch>
+                  <a:fillRect b="-17391"/>
+                </a:stretch>
+              </a:blipFill>
+            </p:spPr>
+            <p:txBody>
+              <a:bodyPr/>
+              <a:lstStyle/>
+              <a:p>
+                <a:r>
+                  <a:rPr lang="en-US">
+                    <a:noFill/>
+                  </a:rPr>
+                  <a:t> </a:t>
+                </a:r>
+              </a:p>
+            </p:txBody>
+          </p:sp>
+        </mc:Fallback>
+      </mc:AlternateContent>
+      <mc:AlternateContent xmlns:mc="http://schemas.openxmlformats.org/markup-compatibility/2006" xmlns:a14="http://schemas.microsoft.com/office/drawing/2010/main">
+        <mc:Choice Requires="a14">
+          <p:sp>
+            <p:nvSpPr>
+              <p:cNvPr id="4" name="TextBox 3">
+                <a:extLst>
+                  <a:ext uri="{FF2B5EF4-FFF2-40B4-BE49-F238E27FC236}">
+                    <a16:creationId xmlns:a16="http://schemas.microsoft.com/office/drawing/2014/main" id="{430AAB02-2D41-7FEF-3EE1-516B6A2DB5FE}"/>
+                  </a:ext>
+                </a:extLst>
+              </p:cNvPr>
+              <p:cNvSpPr txBox="1"/>
+              <p:nvPr/>
+            </p:nvSpPr>
+            <p:spPr>
+              <a:xfrm>
+                <a:off x="8259889" y="686620"/>
+                <a:ext cx="756000" cy="288000"/>
+              </a:xfrm>
+              <a:prstGeom prst="rect">
+                <a:avLst/>
+              </a:prstGeom>
+              <a:solidFill>
+                <a:schemeClr val="bg1"/>
+              </a:solidFill>
+            </p:spPr>
+            <p:txBody>
+              <a:bodyPr wrap="none" rtlCol="0">
+                <a:spAutoFit/>
+              </a:bodyPr>
+              <a:lstStyle/>
+              <a:p>
+                <a:pPr/>
+                <a14:m>
+                  <m:oMathPara xmlns:m="http://schemas.openxmlformats.org/officeDocument/2006/math">
+                    <m:oMathParaPr>
+                      <m:jc m:val="centerGroup"/>
+                    </m:oMathParaPr>
+                    <m:oMath xmlns:m="http://schemas.openxmlformats.org/officeDocument/2006/math">
+                      <m:r>
+                        <a:rPr lang="de-DE" sz="1400" b="0" i="1" smtClean="0">
+                          <a:latin typeface="Cambria Math" panose="02040503050406030204" pitchFamily="18" charset="0"/>
+                          <a:ea typeface="Cambria Math" panose="02040503050406030204" pitchFamily="18" charset="0"/>
+                        </a:rPr>
+                        <m:t>𝑣</m:t>
+                      </m:r>
+                      <m:r>
+                        <a:rPr lang="de-DE" sz="1400" b="0" i="1" smtClean="0">
+                          <a:latin typeface="Cambria Math" panose="02040503050406030204" pitchFamily="18" charset="0"/>
+                          <a:ea typeface="Cambria Math" panose="02040503050406030204" pitchFamily="18" charset="0"/>
+                        </a:rPr>
+                        <m:t>(</m:t>
+                      </m:r>
+                      <m:r>
+                        <a:rPr lang="de-DE" sz="1400" b="1" i="1" smtClean="0">
+                          <a:latin typeface="Cambria Math" panose="02040503050406030204" pitchFamily="18" charset="0"/>
+                          <a:ea typeface="Cambria Math" panose="02040503050406030204" pitchFamily="18" charset="0"/>
+                        </a:rPr>
+                        <m:t>𝒙</m:t>
+                      </m:r>
+                      <m:r>
+                        <a:rPr lang="de-DE" sz="1400" b="0" i="1" smtClean="0">
+                          <a:latin typeface="Cambria Math" panose="02040503050406030204" pitchFamily="18" charset="0"/>
+                          <a:ea typeface="Cambria Math" panose="02040503050406030204" pitchFamily="18" charset="0"/>
+                        </a:rPr>
+                        <m:t>|</m:t>
+                      </m:r>
+                      <m:r>
+                        <a:rPr lang="de-DE" sz="1400" b="0" i="1" smtClean="0">
+                          <a:latin typeface="Cambria Math" panose="02040503050406030204" pitchFamily="18" charset="0"/>
+                          <a:ea typeface="Cambria Math" panose="02040503050406030204" pitchFamily="18" charset="0"/>
+                        </a:rPr>
+                        <m:t>𝐷</m:t>
+                      </m:r>
+                      <m:r>
+                        <a:rPr lang="de-DE" sz="1400" b="0" i="1" smtClean="0">
+                          <a:latin typeface="Cambria Math" panose="02040503050406030204" pitchFamily="18" charset="0"/>
+                          <a:ea typeface="Cambria Math" panose="02040503050406030204" pitchFamily="18" charset="0"/>
+                        </a:rPr>
+                        <m:t>)</m:t>
+                      </m:r>
+                    </m:oMath>
+                  </m:oMathPara>
+                </a14:m>
+                <a:endParaRPr lang="en-US" sz="1400" dirty="0">
+                  <a:latin typeface="Cambria Math" panose="02040503050406030204" pitchFamily="18" charset="0"/>
+                  <a:ea typeface="Cambria Math" panose="02040503050406030204" pitchFamily="18" charset="0"/>
+                </a:endParaRPr>
+              </a:p>
+            </p:txBody>
+          </p:sp>
+        </mc:Choice>
+        <mc:Fallback xmlns="">
+          <p:sp>
+            <p:nvSpPr>
+              <p:cNvPr id="4" name="TextBox 3">
+                <a:extLst>
+                  <a:ext uri="{FF2B5EF4-FFF2-40B4-BE49-F238E27FC236}">
+                    <a16:creationId xmlns:a16="http://schemas.microsoft.com/office/drawing/2014/main" id="{430AAB02-2D41-7FEF-3EE1-516B6A2DB5FE}"/>
+                  </a:ext>
+                </a:extLst>
+              </p:cNvPr>
+              <p:cNvSpPr txBox="1">
+                <a:spLocks noRot="1" noChangeAspect="1" noMove="1" noResize="1" noEditPoints="1" noAdjustHandles="1" noChangeArrowheads="1" noChangeShapeType="1" noTextEdit="1"/>
+              </p:cNvSpPr>
+              <p:nvPr/>
+            </p:nvSpPr>
+            <p:spPr>
+              <a:xfrm>
+                <a:off x="8259889" y="686620"/>
+                <a:ext cx="756000" cy="288000"/>
+              </a:xfrm>
+              <a:prstGeom prst="rect">
+                <a:avLst/>
+              </a:prstGeom>
+              <a:blipFill>
+                <a:blip r:embed="rId8"/>
+                <a:stretch>
+                  <a:fillRect b="-17391"/>
+                </a:stretch>
+              </a:blipFill>
+            </p:spPr>
+            <p:txBody>
+              <a:bodyPr/>
+              <a:lstStyle/>
+              <a:p>
+                <a:r>
+                  <a:rPr lang="en-US">
+                    <a:noFill/>
+                  </a:rPr>
+                  <a:t> </a:t>
+                </a:r>
+              </a:p>
+            </p:txBody>
+          </p:sp>
+        </mc:Fallback>
+      </mc:AlternateContent>
+    </p:spTree>
+    <p:extLst>
+      <p:ext uri="{BB962C8B-B14F-4D97-AF65-F5344CB8AC3E}">
+        <p14:creationId xmlns:p14="http://schemas.microsoft.com/office/powerpoint/2010/main" val="2162781153"/>
       </p:ext>
     </p:extLst>
   </p:cSld>

</xml_diff>